<commit_message>
Update the solver state machine diagram. code optimization
</commit_message>
<xml_diff>
--- a/Flicker.pptx
+++ b/Flicker.pptx
@@ -263,7 +263,7 @@
           <a:p>
             <a:fld id="{9BA82EC9-1B27-4AE6-A228-67888B3E2E79}" type="datetimeFigureOut">
               <a:rPr lang="en-GB" smtClean="0"/>
-              <a:t>14/07/2024</a:t>
+              <a:t>15/07/2024</a:t>
             </a:fld>
             <a:endParaRPr lang="en-GB"/>
           </a:p>
@@ -463,7 +463,7 @@
           <a:p>
             <a:fld id="{9BA82EC9-1B27-4AE6-A228-67888B3E2E79}" type="datetimeFigureOut">
               <a:rPr lang="en-GB" smtClean="0"/>
-              <a:t>14/07/2024</a:t>
+              <a:t>15/07/2024</a:t>
             </a:fld>
             <a:endParaRPr lang="en-GB"/>
           </a:p>
@@ -673,7 +673,7 @@
           <a:p>
             <a:fld id="{9BA82EC9-1B27-4AE6-A228-67888B3E2E79}" type="datetimeFigureOut">
               <a:rPr lang="en-GB" smtClean="0"/>
-              <a:t>14/07/2024</a:t>
+              <a:t>15/07/2024</a:t>
             </a:fld>
             <a:endParaRPr lang="en-GB"/>
           </a:p>
@@ -873,7 +873,7 @@
           <a:p>
             <a:fld id="{9BA82EC9-1B27-4AE6-A228-67888B3E2E79}" type="datetimeFigureOut">
               <a:rPr lang="en-GB" smtClean="0"/>
-              <a:t>14/07/2024</a:t>
+              <a:t>15/07/2024</a:t>
             </a:fld>
             <a:endParaRPr lang="en-GB"/>
           </a:p>
@@ -1149,7 +1149,7 @@
           <a:p>
             <a:fld id="{9BA82EC9-1B27-4AE6-A228-67888B3E2E79}" type="datetimeFigureOut">
               <a:rPr lang="en-GB" smtClean="0"/>
-              <a:t>14/07/2024</a:t>
+              <a:t>15/07/2024</a:t>
             </a:fld>
             <a:endParaRPr lang="en-GB"/>
           </a:p>
@@ -1417,7 +1417,7 @@
           <a:p>
             <a:fld id="{9BA82EC9-1B27-4AE6-A228-67888B3E2E79}" type="datetimeFigureOut">
               <a:rPr lang="en-GB" smtClean="0"/>
-              <a:t>14/07/2024</a:t>
+              <a:t>15/07/2024</a:t>
             </a:fld>
             <a:endParaRPr lang="en-GB"/>
           </a:p>
@@ -1832,7 +1832,7 @@
           <a:p>
             <a:fld id="{9BA82EC9-1B27-4AE6-A228-67888B3E2E79}" type="datetimeFigureOut">
               <a:rPr lang="en-GB" smtClean="0"/>
-              <a:t>14/07/2024</a:t>
+              <a:t>15/07/2024</a:t>
             </a:fld>
             <a:endParaRPr lang="en-GB"/>
           </a:p>
@@ -1974,7 +1974,7 @@
           <a:p>
             <a:fld id="{9BA82EC9-1B27-4AE6-A228-67888B3E2E79}" type="datetimeFigureOut">
               <a:rPr lang="en-GB" smtClean="0"/>
-              <a:t>14/07/2024</a:t>
+              <a:t>15/07/2024</a:t>
             </a:fld>
             <a:endParaRPr lang="en-GB"/>
           </a:p>
@@ -2087,7 +2087,7 @@
           <a:p>
             <a:fld id="{9BA82EC9-1B27-4AE6-A228-67888B3E2E79}" type="datetimeFigureOut">
               <a:rPr lang="en-GB" smtClean="0"/>
-              <a:t>14/07/2024</a:t>
+              <a:t>15/07/2024</a:t>
             </a:fld>
             <a:endParaRPr lang="en-GB"/>
           </a:p>
@@ -2400,7 +2400,7 @@
           <a:p>
             <a:fld id="{9BA82EC9-1B27-4AE6-A228-67888B3E2E79}" type="datetimeFigureOut">
               <a:rPr lang="en-GB" smtClean="0"/>
-              <a:t>14/07/2024</a:t>
+              <a:t>15/07/2024</a:t>
             </a:fld>
             <a:endParaRPr lang="en-GB"/>
           </a:p>
@@ -2689,7 +2689,7 @@
           <a:p>
             <a:fld id="{9BA82EC9-1B27-4AE6-A228-67888B3E2E79}" type="datetimeFigureOut">
               <a:rPr lang="en-GB" smtClean="0"/>
-              <a:t>14/07/2024</a:t>
+              <a:t>15/07/2024</a:t>
             </a:fld>
             <a:endParaRPr lang="en-GB"/>
           </a:p>
@@ -2932,7 +2932,7 @@
           <a:p>
             <a:fld id="{9BA82EC9-1B27-4AE6-A228-67888B3E2E79}" type="datetimeFigureOut">
               <a:rPr lang="en-GB" smtClean="0"/>
-              <a:t>14/07/2024</a:t>
+              <a:t>15/07/2024</a:t>
             </a:fld>
             <a:endParaRPr lang="en-GB"/>
           </a:p>
@@ -4170,8 +4170,8 @@
         </p:nvSpPr>
         <p:spPr>
           <a:xfrm>
-            <a:off x="307819" y="3062334"/>
-            <a:ext cx="1530035" cy="733331"/>
+            <a:off x="1329866" y="3557634"/>
+            <a:ext cx="1390941" cy="733331"/>
           </a:xfrm>
           <a:prstGeom prst="roundRect">
             <a:avLst/>
@@ -4202,7 +4202,7 @@
           <a:p>
             <a:pPr algn="ctr"/>
             <a:r>
-              <a:rPr lang="en-US" b="1" dirty="0">
+              <a:rPr lang="en-US" sz="1600" b="1" dirty="0">
                 <a:solidFill>
                   <a:schemeClr val="tx1"/>
                 </a:solidFill>
@@ -4213,14 +4213,14 @@
           <a:p>
             <a:pPr algn="ctr"/>
             <a:r>
-              <a:rPr lang="en-US" sz="1200" b="1" dirty="0">
+              <a:rPr lang="en-US" sz="1100" b="1" dirty="0">
                 <a:solidFill>
                   <a:schemeClr val="tx1"/>
                 </a:solidFill>
               </a:rPr>
               <a:t>Waiting for User</a:t>
             </a:r>
-            <a:endParaRPr lang="en-GB" sz="1200" b="1" dirty="0">
+            <a:endParaRPr lang="en-GB" sz="1100" b="1" dirty="0">
               <a:solidFill>
                 <a:schemeClr val="tx1"/>
               </a:solidFill>
@@ -4242,8 +4242,8 @@
         </p:nvSpPr>
         <p:spPr>
           <a:xfrm>
-            <a:off x="2526670" y="3062333"/>
-            <a:ext cx="2995190" cy="733331"/>
+            <a:off x="4129429" y="3557634"/>
+            <a:ext cx="2250331" cy="733331"/>
           </a:xfrm>
           <a:prstGeom prst="roundRect">
             <a:avLst/>
@@ -4274,7 +4274,7 @@
           <a:p>
             <a:pPr algn="ctr"/>
             <a:r>
-              <a:rPr lang="en-US" b="1" dirty="0">
+              <a:rPr lang="en-US" sz="1600" b="1" dirty="0">
                 <a:solidFill>
                   <a:schemeClr val="tx1"/>
                 </a:solidFill>
@@ -4284,7 +4284,7 @@
           </a:p>
           <a:p>
             <a:r>
-              <a:rPr lang="en-US" sz="1200" dirty="0">
+              <a:rPr lang="en-US" sz="1100" dirty="0">
                 <a:solidFill>
                   <a:schemeClr val="tx1"/>
                 </a:solidFill>
@@ -4298,7 +4298,7 @@
               <a:buChar char="•"/>
             </a:pPr>
             <a:r>
-              <a:rPr lang="en-US" sz="1200" dirty="0" err="1">
+              <a:rPr lang="en-US" sz="1100" dirty="0" err="1">
                 <a:solidFill>
                   <a:schemeClr val="tx1"/>
                 </a:solidFill>
@@ -4306,7 +4306,7 @@
               <a:t>ProgressLevel</a:t>
             </a:r>
             <a:r>
-              <a:rPr lang="en-US" sz="1200" dirty="0">
+              <a:rPr lang="en-US" sz="1100" dirty="0">
                 <a:solidFill>
                   <a:schemeClr val="tx1"/>
                 </a:solidFill>
@@ -4327,15 +4327,15 @@
           </p:cNvPr>
           <p:cNvCxnSpPr>
             <a:cxnSpLocks/>
-            <a:stCxn id="4" idx="3"/>
+            <a:stCxn id="28" idx="3"/>
             <a:endCxn id="5" idx="1"/>
           </p:cNvCxnSpPr>
           <p:nvPr/>
         </p:nvCxnSpPr>
         <p:spPr>
-          <a:xfrm flipV="1">
-            <a:off x="1837854" y="3428999"/>
-            <a:ext cx="688816" cy="1"/>
+          <a:xfrm>
+            <a:off x="3953740" y="3919139"/>
+            <a:ext cx="175689" cy="5161"/>
           </a:xfrm>
           <a:prstGeom prst="straightConnector1">
             <a:avLst/>
@@ -4373,7 +4373,7 @@
         </p:nvSpPr>
         <p:spPr>
           <a:xfrm>
-            <a:off x="6670141" y="1582092"/>
+            <a:off x="7216241" y="2077392"/>
             <a:ext cx="3835651" cy="1883121"/>
           </a:xfrm>
           <a:prstGeom prst="roundRect">
@@ -4405,7 +4405,7 @@
           <a:p>
             <a:pPr algn="ctr"/>
             <a:r>
-              <a:rPr lang="en-US" b="1" dirty="0">
+              <a:rPr lang="en-US" sz="1600" b="1" dirty="0">
                 <a:solidFill>
                   <a:schemeClr val="tx1"/>
                 </a:solidFill>
@@ -4416,7 +4416,7 @@
           <a:p>
             <a:pPr algn="ctr"/>
             <a:r>
-              <a:rPr lang="en-US" sz="1200" b="1" dirty="0" err="1">
+              <a:rPr lang="en-US" sz="1100" b="1" dirty="0" err="1">
                 <a:solidFill>
                   <a:schemeClr val="tx1"/>
                 </a:solidFill>
@@ -4424,7 +4424,7 @@
               <a:t>SolutionFound</a:t>
             </a:r>
             <a:r>
-              <a:rPr lang="en-US" sz="1200" b="1" dirty="0">
+              <a:rPr lang="en-US" sz="1100" b="1" dirty="0">
                 <a:solidFill>
                   <a:schemeClr val="tx1"/>
                 </a:solidFill>
@@ -4432,7 +4432,7 @@
               <a:t> – </a:t>
             </a:r>
             <a:r>
-              <a:rPr lang="en-US" sz="1200" dirty="0">
+              <a:rPr lang="en-US" sz="1100" dirty="0">
                 <a:solidFill>
                   <a:schemeClr val="tx1"/>
                 </a:solidFill>
@@ -4442,7 +4442,7 @@
           </a:p>
           <a:p>
             <a:pPr algn="ctr"/>
-            <a:endParaRPr lang="en-US" sz="1200" b="1" dirty="0">
+            <a:endParaRPr lang="en-US" sz="1100" b="1" dirty="0">
               <a:solidFill>
                 <a:schemeClr val="tx1"/>
               </a:solidFill>
@@ -4450,7 +4450,7 @@
           </a:p>
           <a:p>
             <a:r>
-              <a:rPr lang="en-US" sz="1200" dirty="0">
+              <a:rPr lang="en-US" sz="1100" dirty="0">
                 <a:solidFill>
                   <a:schemeClr val="tx1"/>
                 </a:solidFill>
@@ -4464,7 +4464,7 @@
               <a:buChar char="•"/>
             </a:pPr>
             <a:r>
-              <a:rPr lang="en-US" sz="1200" dirty="0" err="1">
+              <a:rPr lang="en-US" sz="1100" dirty="0" err="1">
                 <a:solidFill>
                   <a:schemeClr val="tx1"/>
                 </a:solidFill>
@@ -4472,14 +4472,14 @@
               <a:t>WinningDirection</a:t>
             </a:r>
             <a:r>
-              <a:rPr lang="en-US" sz="1200" dirty="0">
+              <a:rPr lang="en-US" sz="1100" dirty="0">
                 <a:solidFill>
                   <a:schemeClr val="tx1"/>
                 </a:solidFill>
               </a:rPr>
               <a:t> –Ball direction that lead to a win</a:t>
             </a:r>
-            <a:endParaRPr lang="en-US" sz="1400" dirty="0">
+            <a:endParaRPr lang="en-US" sz="1200" dirty="0">
               <a:solidFill>
                 <a:schemeClr val="tx1"/>
               </a:solidFill>
@@ -4491,7 +4491,7 @@
               <a:buChar char="•"/>
             </a:pPr>
             <a:r>
-              <a:rPr lang="en-US" sz="1200" dirty="0" err="1">
+              <a:rPr lang="en-US" sz="1100" dirty="0" err="1">
                 <a:solidFill>
                   <a:schemeClr val="tx1"/>
                 </a:solidFill>
@@ -4499,14 +4499,14 @@
               <a:t>MovingChain</a:t>
             </a:r>
             <a:r>
-              <a:rPr lang="en-US" sz="1200" dirty="0">
+              <a:rPr lang="en-US" sz="1100" dirty="0">
                 <a:solidFill>
                   <a:schemeClr val="tx1"/>
                 </a:solidFill>
               </a:rPr>
               <a:t> – Ball position to move from that lead to a win. It may contain multiple ball position if there are adjacent balls</a:t>
             </a:r>
-            <a:endParaRPr lang="en-GB" sz="1400" dirty="0">
+            <a:endParaRPr lang="en-GB" sz="1200" dirty="0">
               <a:solidFill>
                 <a:schemeClr val="tx1"/>
               </a:solidFill>
@@ -4528,7 +4528,7 @@
         </p:nvSpPr>
         <p:spPr>
           <a:xfrm>
-            <a:off x="6746343" y="3795665"/>
+            <a:off x="7292443" y="4290965"/>
             <a:ext cx="3835651" cy="1545878"/>
           </a:xfrm>
           <a:prstGeom prst="roundRect">
@@ -4560,7 +4560,7 @@
           <a:p>
             <a:pPr algn="ctr"/>
             <a:r>
-              <a:rPr lang="en-US" b="1" dirty="0">
+              <a:rPr lang="en-US" sz="1600" b="1" dirty="0">
                 <a:solidFill>
                   <a:schemeClr val="tx1"/>
                 </a:solidFill>
@@ -4571,7 +4571,7 @@
           <a:p>
             <a:pPr algn="ctr"/>
             <a:r>
-              <a:rPr lang="en-US" sz="1200" b="1" dirty="0" err="1">
+              <a:rPr lang="en-US" sz="1100" b="1" dirty="0" err="1">
                 <a:solidFill>
                   <a:schemeClr val="tx1"/>
                 </a:solidFill>
@@ -4579,7 +4579,7 @@
               <a:t>NoSolutionFound</a:t>
             </a:r>
             <a:r>
-              <a:rPr lang="en-US" sz="1200" b="1" dirty="0">
+              <a:rPr lang="en-US" sz="1100" b="1" dirty="0">
                 <a:solidFill>
                   <a:schemeClr val="tx1"/>
                 </a:solidFill>
@@ -4587,7 +4587,7 @@
               <a:t> – </a:t>
             </a:r>
             <a:r>
-              <a:rPr lang="en-US" sz="1200" dirty="0">
+              <a:rPr lang="en-US" sz="1100" dirty="0">
                 <a:solidFill>
                   <a:schemeClr val="tx1"/>
                 </a:solidFill>
@@ -4597,7 +4597,7 @@
           </a:p>
           <a:p>
             <a:pPr algn="ctr"/>
-            <a:endParaRPr lang="en-US" sz="1200" b="1" dirty="0">
+            <a:endParaRPr lang="en-US" sz="1100" b="1" dirty="0">
               <a:solidFill>
                 <a:schemeClr val="tx1"/>
               </a:solidFill>
@@ -4605,7 +4605,7 @@
           </a:p>
           <a:p>
             <a:r>
-              <a:rPr lang="en-GB" sz="1200" dirty="0">
+              <a:rPr lang="en-GB" sz="1100" dirty="0">
                 <a:solidFill>
                   <a:schemeClr val="tx1"/>
                 </a:solidFill>
@@ -4613,7 +4613,7 @@
               <a:t>Data </a:t>
             </a:r>
             <a:r>
-              <a:rPr lang="en-GB" sz="1200" dirty="0" err="1">
+              <a:rPr lang="en-GB" sz="1100" dirty="0" err="1">
                 <a:solidFill>
                   <a:schemeClr val="tx1"/>
                 </a:solidFill>
@@ -4621,7 +4621,7 @@
               <a:t>Structue</a:t>
             </a:r>
             <a:r>
-              <a:rPr lang="en-GB" sz="1200" dirty="0">
+              <a:rPr lang="en-GB" sz="1100" dirty="0">
                 <a:solidFill>
                   <a:schemeClr val="tx1"/>
                 </a:solidFill>
@@ -4635,7 +4635,7 @@
               <a:buChar char="•"/>
             </a:pPr>
             <a:r>
-              <a:rPr lang="en-GB" sz="1200" dirty="0" err="1">
+              <a:rPr lang="en-GB" sz="1100" dirty="0" err="1">
                 <a:solidFill>
                   <a:schemeClr val="tx1"/>
                 </a:solidFill>
@@ -4643,7 +4643,7 @@
               <a:t>WinningDirection</a:t>
             </a:r>
             <a:r>
-              <a:rPr lang="en-GB" sz="1200" dirty="0">
+              <a:rPr lang="en-GB" sz="1100" dirty="0">
                 <a:solidFill>
                   <a:schemeClr val="tx1"/>
                 </a:solidFill>
@@ -4657,7 +4657,7 @@
               <a:buChar char="•"/>
             </a:pPr>
             <a:r>
-              <a:rPr lang="en-GB" sz="1200" dirty="0" err="1">
+              <a:rPr lang="en-GB" sz="1100" dirty="0" err="1">
                 <a:solidFill>
                   <a:schemeClr val="tx1"/>
                 </a:solidFill>
@@ -4665,7 +4665,7 @@
               <a:t>MovingChain</a:t>
             </a:r>
             <a:r>
-              <a:rPr lang="en-GB" sz="1200" dirty="0">
+              <a:rPr lang="en-GB" sz="1100" dirty="0">
                 <a:solidFill>
                   <a:schemeClr val="tx1"/>
                 </a:solidFill>
@@ -4675,7 +4675,7 @@
           </a:p>
           <a:p>
             <a:pPr algn="ctr"/>
-            <a:endParaRPr lang="en-GB" sz="1200" b="1" dirty="0">
+            <a:endParaRPr lang="en-GB" sz="1100" b="1" dirty="0">
               <a:solidFill>
                 <a:schemeClr val="tx1"/>
               </a:solidFill>
@@ -4701,8 +4701,8 @@
         </p:nvCxnSpPr>
         <p:spPr>
           <a:xfrm flipV="1">
-            <a:off x="5521860" y="2523653"/>
-            <a:ext cx="1148281" cy="905346"/>
+            <a:off x="6379760" y="3018953"/>
+            <a:ext cx="836481" cy="905347"/>
           </a:xfrm>
           <a:prstGeom prst="straightConnector1">
             <a:avLst/>
@@ -4744,8 +4744,8 @@
         </p:nvCxnSpPr>
         <p:spPr>
           <a:xfrm>
-            <a:off x="5521860" y="3428999"/>
-            <a:ext cx="1224483" cy="1139605"/>
+            <a:off x="6379760" y="3924300"/>
+            <a:ext cx="912683" cy="1139604"/>
           </a:xfrm>
           <a:prstGeom prst="straightConnector1">
             <a:avLst/>
@@ -4787,12 +4787,12 @@
         </p:nvCxnSpPr>
         <p:spPr>
           <a:xfrm flipH="1" flipV="1">
-            <a:off x="1072837" y="3795665"/>
-            <a:ext cx="9509157" cy="772939"/>
+            <a:off x="2025337" y="4290965"/>
+            <a:ext cx="9102757" cy="772939"/>
           </a:xfrm>
           <a:prstGeom prst="bentConnector4">
             <a:avLst>
-              <a:gd name="adj1" fmla="val -2404"/>
+              <a:gd name="adj1" fmla="val -2511"/>
               <a:gd name="adj2" fmla="val -129575"/>
             </a:avLst>
           </a:prstGeom>
@@ -4827,19 +4827,1042 @@
           <p:cNvCxnSpPr>
             <a:cxnSpLocks/>
             <a:stCxn id="10" idx="3"/>
+            <a:endCxn id="40" idx="3"/>
+          </p:cNvCxnSpPr>
+          <p:nvPr/>
+        </p:nvCxnSpPr>
+        <p:spPr>
+          <a:xfrm flipH="1" flipV="1">
+            <a:off x="5770160" y="1838668"/>
+            <a:ext cx="5281732" cy="1180285"/>
+          </a:xfrm>
+          <a:prstGeom prst="bentConnector3">
+            <a:avLst>
+              <a:gd name="adj1" fmla="val -4328"/>
+            </a:avLst>
+          </a:prstGeom>
+          <a:ln>
+            <a:tailEnd type="triangle"/>
+          </a:ln>
+        </p:spPr>
+        <p:style>
+          <a:lnRef idx="2">
+            <a:schemeClr val="accent1"/>
+          </a:lnRef>
+          <a:fillRef idx="0">
+            <a:schemeClr val="accent1"/>
+          </a:fillRef>
+          <a:effectRef idx="1">
+            <a:schemeClr val="accent1"/>
+          </a:effectRef>
+          <a:fontRef idx="minor">
+            <a:schemeClr val="tx1"/>
+          </a:fontRef>
+        </p:style>
+      </p:cxnSp>
+      <p:sp>
+        <p:nvSpPr>
+          <p:cNvPr id="7" name="Rectangle 6">
+            <a:extLst>
+              <a:ext uri="{FF2B5EF4-FFF2-40B4-BE49-F238E27FC236}">
+                <a16:creationId xmlns:a16="http://schemas.microsoft.com/office/drawing/2014/main" id="{A783A18B-4AAA-11EE-997B-EF0CD4647CF8}"/>
+              </a:ext>
+            </a:extLst>
+          </p:cNvPr>
+          <p:cNvSpPr/>
+          <p:nvPr/>
+        </p:nvSpPr>
+        <p:spPr>
+          <a:xfrm>
+            <a:off x="297517" y="3695700"/>
+            <a:ext cx="734830" cy="450850"/>
+          </a:xfrm>
+          <a:prstGeom prst="rect">
+            <a:avLst/>
+          </a:prstGeom>
+          <a:solidFill>
+            <a:schemeClr val="tx2">
+              <a:lumMod val="50000"/>
+              <a:lumOff val="50000"/>
+            </a:schemeClr>
+          </a:solidFill>
+        </p:spPr>
+        <p:style>
+          <a:lnRef idx="2">
+            <a:schemeClr val="accent1">
+              <a:shade val="15000"/>
+            </a:schemeClr>
+          </a:lnRef>
+          <a:fillRef idx="1">
+            <a:schemeClr val="accent1"/>
+          </a:fillRef>
+          <a:effectRef idx="0">
+            <a:schemeClr val="accent1"/>
+          </a:effectRef>
+          <a:fontRef idx="minor">
+            <a:schemeClr val="lt1"/>
+          </a:fontRef>
+        </p:style>
+        <p:txBody>
+          <a:bodyPr rtlCol="0" anchor="ctr"/>
+          <a:lstStyle/>
+          <a:p>
+            <a:pPr algn="ctr"/>
+            <a:r>
+              <a:rPr lang="en-US" sz="1100" dirty="0"/>
+              <a:t>Start Game</a:t>
+            </a:r>
+            <a:endParaRPr lang="en-GB" sz="1100" dirty="0"/>
+          </a:p>
+        </p:txBody>
+      </p:sp>
+      <p:sp>
+        <p:nvSpPr>
+          <p:cNvPr id="9" name="Rectangle 8">
+            <a:extLst>
+              <a:ext uri="{FF2B5EF4-FFF2-40B4-BE49-F238E27FC236}">
+                <a16:creationId xmlns:a16="http://schemas.microsoft.com/office/drawing/2014/main" id="{32D6E5FA-83F4-4A8D-7346-34DDAA2DB2FC}"/>
+              </a:ext>
+            </a:extLst>
+          </p:cNvPr>
+          <p:cNvSpPr/>
+          <p:nvPr/>
+        </p:nvSpPr>
+        <p:spPr>
+          <a:xfrm>
+            <a:off x="2558117" y="2652288"/>
+            <a:ext cx="734830" cy="450850"/>
+          </a:xfrm>
+          <a:prstGeom prst="rect">
+            <a:avLst/>
+          </a:prstGeom>
+          <a:solidFill>
+            <a:schemeClr val="tx2">
+              <a:lumMod val="50000"/>
+              <a:lumOff val="50000"/>
+            </a:schemeClr>
+          </a:solidFill>
+        </p:spPr>
+        <p:style>
+          <a:lnRef idx="2">
+            <a:schemeClr val="accent1">
+              <a:shade val="15000"/>
+            </a:schemeClr>
+          </a:lnRef>
+          <a:fillRef idx="1">
+            <a:schemeClr val="accent1"/>
+          </a:fillRef>
+          <a:effectRef idx="0">
+            <a:schemeClr val="accent1"/>
+          </a:effectRef>
+          <a:fontRef idx="minor">
+            <a:schemeClr val="lt1"/>
+          </a:fontRef>
+        </p:style>
+        <p:txBody>
+          <a:bodyPr rtlCol="0" anchor="ctr"/>
+          <a:lstStyle/>
+          <a:p>
+            <a:pPr algn="ctr"/>
+            <a:r>
+              <a:rPr lang="en-US" sz="1100" dirty="0"/>
+              <a:t>Toggle Ball</a:t>
+            </a:r>
+            <a:endParaRPr lang="en-GB" sz="1100" dirty="0"/>
+          </a:p>
+        </p:txBody>
+      </p:sp>
+      <p:sp>
+        <p:nvSpPr>
+          <p:cNvPr id="16" name="Rectangle 15">
+            <a:extLst>
+              <a:ext uri="{FF2B5EF4-FFF2-40B4-BE49-F238E27FC236}">
+                <a16:creationId xmlns:a16="http://schemas.microsoft.com/office/drawing/2014/main" id="{9CA18DFB-E3D5-8E9A-09D1-992FB8BDA6A6}"/>
+              </a:ext>
+            </a:extLst>
+          </p:cNvPr>
+          <p:cNvSpPr/>
+          <p:nvPr/>
+        </p:nvSpPr>
+        <p:spPr>
+          <a:xfrm>
+            <a:off x="2353392" y="4624507"/>
+            <a:ext cx="734830" cy="450850"/>
+          </a:xfrm>
+          <a:prstGeom prst="rect">
+            <a:avLst/>
+          </a:prstGeom>
+          <a:solidFill>
+            <a:schemeClr val="tx2">
+              <a:lumMod val="50000"/>
+              <a:lumOff val="50000"/>
+            </a:schemeClr>
+          </a:solidFill>
+        </p:spPr>
+        <p:style>
+          <a:lnRef idx="2">
+            <a:schemeClr val="accent1">
+              <a:shade val="15000"/>
+            </a:schemeClr>
+          </a:lnRef>
+          <a:fillRef idx="1">
+            <a:schemeClr val="accent1"/>
+          </a:fillRef>
+          <a:effectRef idx="0">
+            <a:schemeClr val="accent1"/>
+          </a:effectRef>
+          <a:fontRef idx="minor">
+            <a:schemeClr val="lt1"/>
+          </a:fontRef>
+        </p:style>
+        <p:txBody>
+          <a:bodyPr rtlCol="0" anchor="ctr"/>
+          <a:lstStyle/>
+          <a:p>
+            <a:pPr algn="ctr"/>
+            <a:r>
+              <a:rPr lang="en-US" sz="1100" dirty="0"/>
+              <a:t>Reset</a:t>
+            </a:r>
+            <a:endParaRPr lang="en-GB" sz="1100" dirty="0"/>
+          </a:p>
+        </p:txBody>
+      </p:sp>
+      <p:cxnSp>
+        <p:nvCxnSpPr>
+          <p:cNvPr id="17" name="Straight Arrow Connector 16">
+            <a:extLst>
+              <a:ext uri="{FF2B5EF4-FFF2-40B4-BE49-F238E27FC236}">
+                <a16:creationId xmlns:a16="http://schemas.microsoft.com/office/drawing/2014/main" id="{E8308163-BDEB-8CC7-C64D-7C553108F250}"/>
+              </a:ext>
+            </a:extLst>
+          </p:cNvPr>
+          <p:cNvCxnSpPr>
+            <a:cxnSpLocks/>
+            <a:stCxn id="7" idx="3"/>
+            <a:endCxn id="4" idx="1"/>
+          </p:cNvCxnSpPr>
+          <p:nvPr/>
+        </p:nvCxnSpPr>
+        <p:spPr>
+          <a:xfrm>
+            <a:off x="1032347" y="3921125"/>
+            <a:ext cx="297519" cy="3175"/>
+          </a:xfrm>
+          <a:prstGeom prst="straightConnector1">
+            <a:avLst/>
+          </a:prstGeom>
+          <a:ln>
+            <a:tailEnd type="triangle"/>
+          </a:ln>
+        </p:spPr>
+        <p:style>
+          <a:lnRef idx="2">
+            <a:schemeClr val="accent1"/>
+          </a:lnRef>
+          <a:fillRef idx="0">
+            <a:schemeClr val="accent1"/>
+          </a:fillRef>
+          <a:effectRef idx="1">
+            <a:schemeClr val="accent1"/>
+          </a:effectRef>
+          <a:fontRef idx="minor">
+            <a:schemeClr val="tx1"/>
+          </a:fontRef>
+        </p:style>
+      </p:cxnSp>
+      <p:cxnSp>
+        <p:nvCxnSpPr>
+          <p:cNvPr id="20" name="Straight Arrow Connector 19">
+            <a:extLst>
+              <a:ext uri="{FF2B5EF4-FFF2-40B4-BE49-F238E27FC236}">
+                <a16:creationId xmlns:a16="http://schemas.microsoft.com/office/drawing/2014/main" id="{29720F0E-A38C-11DD-1505-B4567F829E0A}"/>
+              </a:ext>
+            </a:extLst>
+          </p:cNvPr>
+          <p:cNvCxnSpPr>
+            <a:cxnSpLocks/>
+            <a:endCxn id="9" idx="2"/>
+          </p:cNvCxnSpPr>
+          <p:nvPr/>
+        </p:nvCxnSpPr>
+        <p:spPr>
+          <a:xfrm flipV="1">
+            <a:off x="2481915" y="3103138"/>
+            <a:ext cx="443617" cy="439157"/>
+          </a:xfrm>
+          <a:prstGeom prst="straightConnector1">
+            <a:avLst/>
+          </a:prstGeom>
+          <a:ln>
+            <a:headEnd type="triangle"/>
+            <a:tailEnd type="triangle"/>
+          </a:ln>
+        </p:spPr>
+        <p:style>
+          <a:lnRef idx="2">
+            <a:schemeClr val="accent1"/>
+          </a:lnRef>
+          <a:fillRef idx="0">
+            <a:schemeClr val="accent1"/>
+          </a:fillRef>
+          <a:effectRef idx="1">
+            <a:schemeClr val="accent1"/>
+          </a:effectRef>
+          <a:fontRef idx="minor">
+            <a:schemeClr val="tx1"/>
+          </a:fontRef>
+        </p:style>
+      </p:cxnSp>
+      <p:cxnSp>
+        <p:nvCxnSpPr>
+          <p:cNvPr id="25" name="Straight Arrow Connector 24">
+            <a:extLst>
+              <a:ext uri="{FF2B5EF4-FFF2-40B4-BE49-F238E27FC236}">
+                <a16:creationId xmlns:a16="http://schemas.microsoft.com/office/drawing/2014/main" id="{B6D028EE-EDCA-ED98-DBEC-56404DC788DB}"/>
+              </a:ext>
+            </a:extLst>
+          </p:cNvPr>
+          <p:cNvCxnSpPr>
+            <a:cxnSpLocks/>
+            <a:endCxn id="16" idx="0"/>
+          </p:cNvCxnSpPr>
+          <p:nvPr/>
+        </p:nvCxnSpPr>
+        <p:spPr>
+          <a:xfrm>
+            <a:off x="2419350" y="4306304"/>
+            <a:ext cx="301457" cy="318203"/>
+          </a:xfrm>
+          <a:prstGeom prst="straightConnector1">
+            <a:avLst/>
+          </a:prstGeom>
+          <a:ln>
+            <a:headEnd type="triangle"/>
+            <a:tailEnd type="triangle"/>
+          </a:ln>
+        </p:spPr>
+        <p:style>
+          <a:lnRef idx="2">
+            <a:schemeClr val="accent1"/>
+          </a:lnRef>
+          <a:fillRef idx="0">
+            <a:schemeClr val="accent1"/>
+          </a:fillRef>
+          <a:effectRef idx="1">
+            <a:schemeClr val="accent1"/>
+          </a:effectRef>
+          <a:fontRef idx="minor">
+            <a:schemeClr val="tx1"/>
+          </a:fontRef>
+        </p:style>
+      </p:cxnSp>
+      <p:sp>
+        <p:nvSpPr>
+          <p:cNvPr id="28" name="Rectangle 27">
+            <a:extLst>
+              <a:ext uri="{FF2B5EF4-FFF2-40B4-BE49-F238E27FC236}">
+                <a16:creationId xmlns:a16="http://schemas.microsoft.com/office/drawing/2014/main" id="{0FC80B8D-8D6C-F419-9956-FF87B79737EB}"/>
+              </a:ext>
+            </a:extLst>
+          </p:cNvPr>
+          <p:cNvSpPr/>
+          <p:nvPr/>
+        </p:nvSpPr>
+        <p:spPr>
+          <a:xfrm>
+            <a:off x="2896496" y="3693714"/>
+            <a:ext cx="1057244" cy="450850"/>
+          </a:xfrm>
+          <a:prstGeom prst="rect">
+            <a:avLst/>
+          </a:prstGeom>
+          <a:solidFill>
+            <a:schemeClr val="tx2">
+              <a:lumMod val="50000"/>
+              <a:lumOff val="50000"/>
+            </a:schemeClr>
+          </a:solidFill>
+        </p:spPr>
+        <p:style>
+          <a:lnRef idx="2">
+            <a:schemeClr val="accent1">
+              <a:shade val="15000"/>
+            </a:schemeClr>
+          </a:lnRef>
+          <a:fillRef idx="1">
+            <a:schemeClr val="accent1"/>
+          </a:fillRef>
+          <a:effectRef idx="0">
+            <a:schemeClr val="accent1"/>
+          </a:effectRef>
+          <a:fontRef idx="minor">
+            <a:schemeClr val="lt1"/>
+          </a:fontRef>
+        </p:style>
+        <p:txBody>
+          <a:bodyPr rtlCol="0" anchor="ctr"/>
+          <a:lstStyle/>
+          <a:p>
+            <a:pPr algn="ctr"/>
+            <a:r>
+              <a:rPr lang="en-US" sz="1100" dirty="0"/>
+              <a:t>Find winning move</a:t>
+            </a:r>
+            <a:endParaRPr lang="en-GB" sz="1100" dirty="0"/>
+          </a:p>
+        </p:txBody>
+      </p:sp>
+      <p:cxnSp>
+        <p:nvCxnSpPr>
+          <p:cNvPr id="33" name="Straight Arrow Connector 32">
+            <a:extLst>
+              <a:ext uri="{FF2B5EF4-FFF2-40B4-BE49-F238E27FC236}">
+                <a16:creationId xmlns:a16="http://schemas.microsoft.com/office/drawing/2014/main" id="{AA5DFA95-D7B1-EF10-D778-C3D5A09EB32D}"/>
+              </a:ext>
+            </a:extLst>
+          </p:cNvPr>
+          <p:cNvCxnSpPr>
+            <a:cxnSpLocks/>
+          </p:cNvCxnSpPr>
+          <p:nvPr/>
+        </p:nvCxnSpPr>
+        <p:spPr>
+          <a:xfrm>
+            <a:off x="2720807" y="3925840"/>
+            <a:ext cx="175689" cy="5161"/>
+          </a:xfrm>
+          <a:prstGeom prst="straightConnector1">
+            <a:avLst/>
+          </a:prstGeom>
+          <a:ln>
+            <a:tailEnd type="triangle"/>
+          </a:ln>
+        </p:spPr>
+        <p:style>
+          <a:lnRef idx="2">
+            <a:schemeClr val="accent1"/>
+          </a:lnRef>
+          <a:fillRef idx="0">
+            <a:schemeClr val="accent1"/>
+          </a:fillRef>
+          <a:effectRef idx="1">
+            <a:schemeClr val="accent1"/>
+          </a:effectRef>
+          <a:fontRef idx="minor">
+            <a:schemeClr val="tx1"/>
+          </a:fontRef>
+        </p:style>
+      </p:cxnSp>
+      <p:sp>
+        <p:nvSpPr>
+          <p:cNvPr id="34" name="Rectangle 33">
+            <a:extLst>
+              <a:ext uri="{FF2B5EF4-FFF2-40B4-BE49-F238E27FC236}">
+                <a16:creationId xmlns:a16="http://schemas.microsoft.com/office/drawing/2014/main" id="{BE69C9C8-217B-7AB5-687A-24B6A4B4F27F}"/>
+              </a:ext>
+            </a:extLst>
+          </p:cNvPr>
+          <p:cNvSpPr/>
+          <p:nvPr/>
+        </p:nvSpPr>
+        <p:spPr>
+          <a:xfrm>
+            <a:off x="526626" y="4956834"/>
+            <a:ext cx="1011442" cy="450850"/>
+          </a:xfrm>
+          <a:prstGeom prst="rect">
+            <a:avLst/>
+          </a:prstGeom>
+          <a:solidFill>
+            <a:schemeClr val="tx2">
+              <a:lumMod val="50000"/>
+              <a:lumOff val="50000"/>
+            </a:schemeClr>
+          </a:solidFill>
+        </p:spPr>
+        <p:style>
+          <a:lnRef idx="2">
+            <a:schemeClr val="accent1">
+              <a:shade val="15000"/>
+            </a:schemeClr>
+          </a:lnRef>
+          <a:fillRef idx="1">
+            <a:schemeClr val="accent1"/>
+          </a:fillRef>
+          <a:effectRef idx="0">
+            <a:schemeClr val="accent1"/>
+          </a:effectRef>
+          <a:fontRef idx="minor">
+            <a:schemeClr val="lt1"/>
+          </a:fontRef>
+        </p:style>
+        <p:txBody>
+          <a:bodyPr rtlCol="0" anchor="ctr"/>
+          <a:lstStyle/>
+          <a:p>
+            <a:pPr algn="ctr"/>
+            <a:r>
+              <a:rPr lang="en-US" sz="1100" dirty="0"/>
+              <a:t>Exit / </a:t>
+            </a:r>
+            <a:r>
+              <a:rPr lang="en-US" sz="1100" dirty="0" err="1"/>
+              <a:t>Backpressed</a:t>
+            </a:r>
+            <a:endParaRPr lang="en-GB" sz="1100" dirty="0"/>
+          </a:p>
+        </p:txBody>
+      </p:sp>
+      <p:cxnSp>
+        <p:nvCxnSpPr>
+          <p:cNvPr id="35" name="Straight Arrow Connector 34">
+            <a:extLst>
+              <a:ext uri="{FF2B5EF4-FFF2-40B4-BE49-F238E27FC236}">
+                <a16:creationId xmlns:a16="http://schemas.microsoft.com/office/drawing/2014/main" id="{4352139A-EC59-A98A-C8FC-55DC4FF44395}"/>
+              </a:ext>
+            </a:extLst>
+          </p:cNvPr>
+          <p:cNvCxnSpPr>
+            <a:cxnSpLocks/>
+            <a:endCxn id="34" idx="0"/>
+          </p:cNvCxnSpPr>
+          <p:nvPr/>
+        </p:nvCxnSpPr>
+        <p:spPr>
+          <a:xfrm flipH="1">
+            <a:off x="1032347" y="4284104"/>
+            <a:ext cx="625575" cy="672730"/>
+          </a:xfrm>
+          <a:prstGeom prst="straightConnector1">
+            <a:avLst/>
+          </a:prstGeom>
+          <a:ln>
+            <a:tailEnd type="triangle"/>
+          </a:ln>
+        </p:spPr>
+        <p:style>
+          <a:lnRef idx="2">
+            <a:schemeClr val="accent1"/>
+          </a:lnRef>
+          <a:fillRef idx="0">
+            <a:schemeClr val="accent1"/>
+          </a:fillRef>
+          <a:effectRef idx="1">
+            <a:schemeClr val="accent1"/>
+          </a:effectRef>
+          <a:fontRef idx="minor">
+            <a:schemeClr val="tx1"/>
+          </a:fontRef>
+        </p:style>
+      </p:cxnSp>
+      <p:sp>
+        <p:nvSpPr>
+          <p:cNvPr id="39" name="Rectangle 38">
+            <a:extLst>
+              <a:ext uri="{FF2B5EF4-FFF2-40B4-BE49-F238E27FC236}">
+                <a16:creationId xmlns:a16="http://schemas.microsoft.com/office/drawing/2014/main" id="{A488A4E3-E4C7-26AC-CBCE-BA603022E177}"/>
+              </a:ext>
+            </a:extLst>
+          </p:cNvPr>
+          <p:cNvSpPr/>
+          <p:nvPr/>
+        </p:nvSpPr>
+        <p:spPr>
+          <a:xfrm>
+            <a:off x="4493143" y="2404091"/>
+            <a:ext cx="1520974" cy="450850"/>
+          </a:xfrm>
+          <a:prstGeom prst="rect">
+            <a:avLst/>
+          </a:prstGeom>
+          <a:solidFill>
+            <a:schemeClr val="tx2">
+              <a:lumMod val="50000"/>
+              <a:lumOff val="50000"/>
+            </a:schemeClr>
+          </a:solidFill>
+        </p:spPr>
+        <p:style>
+          <a:lnRef idx="2">
+            <a:schemeClr val="accent1">
+              <a:shade val="15000"/>
+            </a:schemeClr>
+          </a:lnRef>
+          <a:fillRef idx="1">
+            <a:schemeClr val="accent1"/>
+          </a:fillRef>
+          <a:effectRef idx="0">
+            <a:schemeClr val="accent1"/>
+          </a:effectRef>
+          <a:fontRef idx="minor">
+            <a:schemeClr val="lt1"/>
+          </a:fontRef>
+        </p:style>
+        <p:txBody>
+          <a:bodyPr rtlCol="0" anchor="ctr"/>
+          <a:lstStyle/>
+          <a:p>
+            <a:pPr algn="ctr"/>
+            <a:r>
+              <a:rPr lang="en-US" sz="1100" dirty="0"/>
+              <a:t>Make move and find next winning move</a:t>
+            </a:r>
+            <a:endParaRPr lang="en-GB" sz="1100" dirty="0"/>
+          </a:p>
+        </p:txBody>
+      </p:sp>
+      <p:sp>
+        <p:nvSpPr>
+          <p:cNvPr id="40" name="Diamond 39">
+            <a:extLst>
+              <a:ext uri="{FF2B5EF4-FFF2-40B4-BE49-F238E27FC236}">
+                <a16:creationId xmlns:a16="http://schemas.microsoft.com/office/drawing/2014/main" id="{2D3850C9-F49A-10A8-9423-C6318A8CC51F}"/>
+              </a:ext>
+            </a:extLst>
+          </p:cNvPr>
+          <p:cNvSpPr/>
+          <p:nvPr/>
+        </p:nvSpPr>
+        <p:spPr>
+          <a:xfrm>
+            <a:off x="4737100" y="1476361"/>
+            <a:ext cx="1033060" cy="724614"/>
+          </a:xfrm>
+          <a:prstGeom prst="diamond">
+            <a:avLst/>
+          </a:prstGeom>
+          <a:solidFill>
+            <a:srgbClr val="FFFF00"/>
+          </a:solidFill>
+        </p:spPr>
+        <p:style>
+          <a:lnRef idx="2">
+            <a:schemeClr val="accent1">
+              <a:shade val="15000"/>
+            </a:schemeClr>
+          </a:lnRef>
+          <a:fillRef idx="1">
+            <a:schemeClr val="accent1"/>
+          </a:fillRef>
+          <a:effectRef idx="0">
+            <a:schemeClr val="accent1"/>
+          </a:effectRef>
+          <a:fontRef idx="minor">
+            <a:schemeClr val="lt1"/>
+          </a:fontRef>
+        </p:style>
+        <p:txBody>
+          <a:bodyPr rtlCol="0" anchor="ctr"/>
+          <a:lstStyle/>
+          <a:p>
+            <a:pPr algn="ctr"/>
+            <a:r>
+              <a:rPr lang="en-US" sz="1050" dirty="0">
+                <a:solidFill>
+                  <a:schemeClr val="tx1"/>
+                </a:solidFill>
+              </a:rPr>
+              <a:t>One ball left?</a:t>
+            </a:r>
+            <a:endParaRPr lang="en-GB" sz="1050" dirty="0">
+              <a:solidFill>
+                <a:schemeClr val="tx1"/>
+              </a:solidFill>
+            </a:endParaRPr>
+          </a:p>
+        </p:txBody>
+      </p:sp>
+      <p:cxnSp>
+        <p:nvCxnSpPr>
+          <p:cNvPr id="42" name="Straight Arrow Connector 14">
+            <a:extLst>
+              <a:ext uri="{FF2B5EF4-FFF2-40B4-BE49-F238E27FC236}">
+                <a16:creationId xmlns:a16="http://schemas.microsoft.com/office/drawing/2014/main" id="{BB3FE082-AABB-01C6-511B-24F71A4D6C6B}"/>
+              </a:ext>
+            </a:extLst>
+          </p:cNvPr>
+          <p:cNvCxnSpPr>
+            <a:cxnSpLocks/>
+            <a:stCxn id="54" idx="1"/>
             <a:endCxn id="4" idx="0"/>
           </p:cNvCxnSpPr>
           <p:nvPr/>
         </p:nvCxnSpPr>
         <p:spPr>
+          <a:xfrm rot="10800000" flipV="1">
+            <a:off x="2025337" y="1829794"/>
+            <a:ext cx="695470" cy="1727839"/>
+          </a:xfrm>
+          <a:prstGeom prst="bentConnector2">
+            <a:avLst/>
+          </a:prstGeom>
+          <a:ln>
+            <a:tailEnd type="triangle"/>
+          </a:ln>
+        </p:spPr>
+        <p:style>
+          <a:lnRef idx="2">
+            <a:schemeClr val="accent1"/>
+          </a:lnRef>
+          <a:fillRef idx="0">
+            <a:schemeClr val="accent1"/>
+          </a:fillRef>
+          <a:effectRef idx="1">
+            <a:schemeClr val="accent1"/>
+          </a:effectRef>
+          <a:fontRef idx="minor">
+            <a:schemeClr val="tx1"/>
+          </a:fontRef>
+        </p:style>
+      </p:cxnSp>
+      <p:sp>
+        <p:nvSpPr>
+          <p:cNvPr id="45" name="TextBox 44">
+            <a:extLst>
+              <a:ext uri="{FF2B5EF4-FFF2-40B4-BE49-F238E27FC236}">
+                <a16:creationId xmlns:a16="http://schemas.microsoft.com/office/drawing/2014/main" id="{DFEB90A8-5E91-91AF-264C-C8C563C83E69}"/>
+              </a:ext>
+            </a:extLst>
+          </p:cNvPr>
+          <p:cNvSpPr txBox="1"/>
+          <p:nvPr/>
+        </p:nvSpPr>
+        <p:spPr>
+          <a:xfrm>
+            <a:off x="4457104" y="1567377"/>
+            <a:ext cx="264752" cy="215444"/>
+          </a:xfrm>
+          <a:prstGeom prst="rect">
+            <a:avLst/>
+          </a:prstGeom>
+          <a:noFill/>
+        </p:spPr>
+        <p:txBody>
+          <a:bodyPr wrap="none" lIns="0" tIns="0" rIns="0" bIns="0" rtlCol="0">
+            <a:spAutoFit/>
+          </a:bodyPr>
+          <a:lstStyle/>
+          <a:p>
+            <a:r>
+              <a:rPr lang="en-US" sz="1400" dirty="0"/>
+              <a:t>Yes</a:t>
+            </a:r>
+            <a:endParaRPr lang="en-GB" sz="1400" dirty="0"/>
+          </a:p>
+        </p:txBody>
+      </p:sp>
+      <p:sp>
+        <p:nvSpPr>
+          <p:cNvPr id="46" name="TextBox 45">
+            <a:extLst>
+              <a:ext uri="{FF2B5EF4-FFF2-40B4-BE49-F238E27FC236}">
+                <a16:creationId xmlns:a16="http://schemas.microsoft.com/office/drawing/2014/main" id="{D8EEB262-9320-9DE4-FD6D-670FD70D991B}"/>
+              </a:ext>
+            </a:extLst>
+          </p:cNvPr>
+          <p:cNvSpPr txBox="1"/>
+          <p:nvPr/>
+        </p:nvSpPr>
+        <p:spPr>
+          <a:xfrm>
+            <a:off x="5398883" y="2144157"/>
+            <a:ext cx="226024" cy="215444"/>
+          </a:xfrm>
+          <a:prstGeom prst="rect">
+            <a:avLst/>
+          </a:prstGeom>
+          <a:noFill/>
+        </p:spPr>
+        <p:txBody>
+          <a:bodyPr wrap="none" lIns="0" tIns="0" rIns="0" bIns="0" rtlCol="0">
+            <a:spAutoFit/>
+          </a:bodyPr>
+          <a:lstStyle/>
+          <a:p>
+            <a:r>
+              <a:rPr lang="en-US" sz="1400" dirty="0"/>
+              <a:t>No</a:t>
+            </a:r>
+            <a:endParaRPr lang="en-GB" sz="1400" dirty="0"/>
+          </a:p>
+        </p:txBody>
+      </p:sp>
+      <p:cxnSp>
+        <p:nvCxnSpPr>
+          <p:cNvPr id="47" name="Straight Arrow Connector 46">
+            <a:extLst>
+              <a:ext uri="{FF2B5EF4-FFF2-40B4-BE49-F238E27FC236}">
+                <a16:creationId xmlns:a16="http://schemas.microsoft.com/office/drawing/2014/main" id="{EF637A07-13A6-8AB3-232D-A04E4EA9671C}"/>
+              </a:ext>
+            </a:extLst>
+          </p:cNvPr>
+          <p:cNvCxnSpPr>
+            <a:cxnSpLocks/>
+            <a:stCxn id="40" idx="2"/>
+            <a:endCxn id="39" idx="0"/>
+          </p:cNvCxnSpPr>
+          <p:nvPr/>
+        </p:nvCxnSpPr>
+        <p:spPr>
+          <a:xfrm>
+            <a:off x="5253630" y="2200975"/>
+            <a:ext cx="0" cy="203116"/>
+          </a:xfrm>
+          <a:prstGeom prst="straightConnector1">
+            <a:avLst/>
+          </a:prstGeom>
+          <a:ln>
+            <a:tailEnd type="triangle"/>
+          </a:ln>
+        </p:spPr>
+        <p:style>
+          <a:lnRef idx="2">
+            <a:schemeClr val="accent1"/>
+          </a:lnRef>
+          <a:fillRef idx="0">
+            <a:schemeClr val="accent1"/>
+          </a:fillRef>
+          <a:effectRef idx="1">
+            <a:schemeClr val="accent1"/>
+          </a:effectRef>
+          <a:fontRef idx="minor">
+            <a:schemeClr val="tx1"/>
+          </a:fontRef>
+        </p:style>
+      </p:cxnSp>
+      <p:cxnSp>
+        <p:nvCxnSpPr>
+          <p:cNvPr id="51" name="Straight Arrow Connector 50">
+            <a:extLst>
+              <a:ext uri="{FF2B5EF4-FFF2-40B4-BE49-F238E27FC236}">
+                <a16:creationId xmlns:a16="http://schemas.microsoft.com/office/drawing/2014/main" id="{0014D005-267A-FFBE-99E3-731A03710D62}"/>
+              </a:ext>
+            </a:extLst>
+          </p:cNvPr>
+          <p:cNvCxnSpPr>
+            <a:cxnSpLocks/>
+            <a:stCxn id="39" idx="2"/>
+            <a:endCxn id="59" idx="0"/>
+          </p:cNvCxnSpPr>
+          <p:nvPr/>
+        </p:nvCxnSpPr>
+        <p:spPr>
           <a:xfrm flipH="1">
-            <a:off x="1072837" y="2523653"/>
-            <a:ext cx="9432955" cy="538681"/>
-          </a:xfrm>
-          <a:prstGeom prst="bentConnector4">
+            <a:off x="5251370" y="2854941"/>
+            <a:ext cx="2260" cy="154208"/>
+          </a:xfrm>
+          <a:prstGeom prst="straightConnector1">
+            <a:avLst/>
+          </a:prstGeom>
+          <a:ln>
+            <a:tailEnd type="triangle"/>
+          </a:ln>
+        </p:spPr>
+        <p:style>
+          <a:lnRef idx="2">
+            <a:schemeClr val="accent1"/>
+          </a:lnRef>
+          <a:fillRef idx="0">
+            <a:schemeClr val="accent1"/>
+          </a:fillRef>
+          <a:effectRef idx="1">
+            <a:schemeClr val="accent1"/>
+          </a:effectRef>
+          <a:fontRef idx="minor">
+            <a:schemeClr val="tx1"/>
+          </a:fontRef>
+        </p:style>
+      </p:cxnSp>
+      <p:sp>
+        <p:nvSpPr>
+          <p:cNvPr id="54" name="Rectangle: Rounded Corners 53">
+            <a:extLst>
+              <a:ext uri="{FF2B5EF4-FFF2-40B4-BE49-F238E27FC236}">
+                <a16:creationId xmlns:a16="http://schemas.microsoft.com/office/drawing/2014/main" id="{4F74977C-91FE-774E-3824-5E9BA96DA046}"/>
+              </a:ext>
+            </a:extLst>
+          </p:cNvPr>
+          <p:cNvSpPr/>
+          <p:nvPr/>
+        </p:nvSpPr>
+        <p:spPr>
+          <a:xfrm>
+            <a:off x="2720807" y="1633411"/>
+            <a:ext cx="834742" cy="392768"/>
+          </a:xfrm>
+          <a:prstGeom prst="roundRect">
+            <a:avLst/>
+          </a:prstGeom>
+          <a:solidFill>
+            <a:schemeClr val="accent2"/>
+          </a:solidFill>
+        </p:spPr>
+        <p:style>
+          <a:lnRef idx="2">
+            <a:schemeClr val="accent1">
+              <a:shade val="15000"/>
+            </a:schemeClr>
+          </a:lnRef>
+          <a:fillRef idx="1">
+            <a:schemeClr val="accent1"/>
+          </a:fillRef>
+          <a:effectRef idx="0">
+            <a:schemeClr val="accent1"/>
+          </a:effectRef>
+          <a:fontRef idx="minor">
+            <a:schemeClr val="lt1"/>
+          </a:fontRef>
+        </p:style>
+        <p:txBody>
+          <a:bodyPr rtlCol="0" anchor="ctr"/>
+          <a:lstStyle/>
+          <a:p>
+            <a:pPr algn="ctr"/>
+            <a:r>
+              <a:rPr lang="en-US" sz="1100" dirty="0">
+                <a:solidFill>
+                  <a:schemeClr val="tx1"/>
+                </a:solidFill>
+              </a:rPr>
+              <a:t>Victory Message</a:t>
+            </a:r>
+            <a:endParaRPr lang="en-GB" sz="1100" dirty="0">
+              <a:solidFill>
+                <a:schemeClr val="tx1"/>
+              </a:solidFill>
+            </a:endParaRPr>
+          </a:p>
+        </p:txBody>
+      </p:sp>
+      <p:cxnSp>
+        <p:nvCxnSpPr>
+          <p:cNvPr id="56" name="Straight Arrow Connector 55">
+            <a:extLst>
+              <a:ext uri="{FF2B5EF4-FFF2-40B4-BE49-F238E27FC236}">
+                <a16:creationId xmlns:a16="http://schemas.microsoft.com/office/drawing/2014/main" id="{AB5E24FA-8591-F500-7877-06CD41A83E35}"/>
+              </a:ext>
+            </a:extLst>
+          </p:cNvPr>
+          <p:cNvCxnSpPr>
+            <a:cxnSpLocks/>
+            <a:stCxn id="40" idx="1"/>
+            <a:endCxn id="54" idx="3"/>
+          </p:cNvCxnSpPr>
+          <p:nvPr/>
+        </p:nvCxnSpPr>
+        <p:spPr>
+          <a:xfrm flipH="1" flipV="1">
+            <a:off x="3555549" y="1829795"/>
+            <a:ext cx="1181551" cy="8873"/>
+          </a:xfrm>
+          <a:prstGeom prst="straightConnector1">
+            <a:avLst/>
+          </a:prstGeom>
+          <a:ln>
+            <a:tailEnd type="triangle"/>
+          </a:ln>
+        </p:spPr>
+        <p:style>
+          <a:lnRef idx="2">
+            <a:schemeClr val="accent1"/>
+          </a:lnRef>
+          <a:fillRef idx="0">
+            <a:schemeClr val="accent1"/>
+          </a:fillRef>
+          <a:effectRef idx="1">
+            <a:schemeClr val="accent1"/>
+          </a:effectRef>
+          <a:fontRef idx="minor">
+            <a:schemeClr val="tx1"/>
+          </a:fontRef>
+        </p:style>
+      </p:cxnSp>
+      <p:sp>
+        <p:nvSpPr>
+          <p:cNvPr id="59" name="Rectangle: Rounded Corners 58">
+            <a:extLst>
+              <a:ext uri="{FF2B5EF4-FFF2-40B4-BE49-F238E27FC236}">
+                <a16:creationId xmlns:a16="http://schemas.microsoft.com/office/drawing/2014/main" id="{1BD9117D-56AE-4C14-7BDA-18F43CC0F7D3}"/>
+              </a:ext>
+            </a:extLst>
+          </p:cNvPr>
+          <p:cNvSpPr/>
+          <p:nvPr/>
+        </p:nvSpPr>
+        <p:spPr>
+          <a:xfrm>
+            <a:off x="4721856" y="3009149"/>
+            <a:ext cx="1059027" cy="253861"/>
+          </a:xfrm>
+          <a:prstGeom prst="roundRect">
+            <a:avLst/>
+          </a:prstGeom>
+          <a:solidFill>
+            <a:schemeClr val="accent2"/>
+          </a:solidFill>
+        </p:spPr>
+        <p:style>
+          <a:lnRef idx="2">
+            <a:schemeClr val="accent1">
+              <a:shade val="15000"/>
+            </a:schemeClr>
+          </a:lnRef>
+          <a:fillRef idx="1">
+            <a:schemeClr val="accent1"/>
+          </a:fillRef>
+          <a:effectRef idx="0">
+            <a:schemeClr val="accent1"/>
+          </a:effectRef>
+          <a:fontRef idx="minor">
+            <a:schemeClr val="lt1"/>
+          </a:fontRef>
+        </p:style>
+        <p:txBody>
+          <a:bodyPr rtlCol="0" anchor="ctr"/>
+          <a:lstStyle/>
+          <a:p>
+            <a:pPr algn="ctr"/>
+            <a:r>
+              <a:rPr lang="en-US" sz="1100" dirty="0">
+                <a:solidFill>
+                  <a:schemeClr val="tx1"/>
+                </a:solidFill>
+              </a:rPr>
+              <a:t>Move the ball</a:t>
+            </a:r>
+            <a:endParaRPr lang="en-GB" sz="1100" dirty="0">
+              <a:solidFill>
+                <a:schemeClr val="tx1"/>
+              </a:solidFill>
+            </a:endParaRPr>
+          </a:p>
+        </p:txBody>
+      </p:sp>
+      <p:cxnSp>
+        <p:nvCxnSpPr>
+          <p:cNvPr id="62" name="Straight Arrow Connector 14">
+            <a:extLst>
+              <a:ext uri="{FF2B5EF4-FFF2-40B4-BE49-F238E27FC236}">
+                <a16:creationId xmlns:a16="http://schemas.microsoft.com/office/drawing/2014/main" id="{9672F2E6-1BC2-147E-F5A7-979D1B2E6CC0}"/>
+              </a:ext>
+            </a:extLst>
+          </p:cNvPr>
+          <p:cNvCxnSpPr>
+            <a:cxnSpLocks/>
+            <a:stCxn id="59" idx="2"/>
+            <a:endCxn id="28" idx="0"/>
+          </p:cNvCxnSpPr>
+          <p:nvPr/>
+        </p:nvCxnSpPr>
+        <p:spPr>
+          <a:xfrm rot="5400000">
+            <a:off x="4122892" y="2565236"/>
+            <a:ext cx="430704" cy="1826252"/>
+          </a:xfrm>
+          <a:prstGeom prst="bentConnector3">
             <a:avLst>
-              <a:gd name="adj1" fmla="val -2423"/>
-              <a:gd name="adj2" fmla="val -217227"/>
+              <a:gd name="adj1" fmla="val 50000"/>
             </a:avLst>
           </a:prstGeom>
           <a:ln>

</xml_diff>

<commit_message>
Update documentation. Add comments
</commit_message>
<xml_diff>
--- a/Flicker.pptx
+++ b/Flicker.pptx
@@ -262,7 +262,7 @@
           <a:p>
             <a:fld id="{9BA82EC9-1B27-4AE6-A228-67888B3E2E79}" type="datetimeFigureOut">
               <a:rPr lang="en-GB" smtClean="0"/>
-              <a:t>15/07/2024</a:t>
+              <a:t>16/07/2024</a:t>
             </a:fld>
             <a:endParaRPr lang="en-GB"/>
           </a:p>
@@ -462,7 +462,7 @@
           <a:p>
             <a:fld id="{9BA82EC9-1B27-4AE6-A228-67888B3E2E79}" type="datetimeFigureOut">
               <a:rPr lang="en-GB" smtClean="0"/>
-              <a:t>15/07/2024</a:t>
+              <a:t>16/07/2024</a:t>
             </a:fld>
             <a:endParaRPr lang="en-GB"/>
           </a:p>
@@ -672,7 +672,7 @@
           <a:p>
             <a:fld id="{9BA82EC9-1B27-4AE6-A228-67888B3E2E79}" type="datetimeFigureOut">
               <a:rPr lang="en-GB" smtClean="0"/>
-              <a:t>15/07/2024</a:t>
+              <a:t>16/07/2024</a:t>
             </a:fld>
             <a:endParaRPr lang="en-GB"/>
           </a:p>
@@ -872,7 +872,7 @@
           <a:p>
             <a:fld id="{9BA82EC9-1B27-4AE6-A228-67888B3E2E79}" type="datetimeFigureOut">
               <a:rPr lang="en-GB" smtClean="0"/>
-              <a:t>15/07/2024</a:t>
+              <a:t>16/07/2024</a:t>
             </a:fld>
             <a:endParaRPr lang="en-GB"/>
           </a:p>
@@ -1148,7 +1148,7 @@
           <a:p>
             <a:fld id="{9BA82EC9-1B27-4AE6-A228-67888B3E2E79}" type="datetimeFigureOut">
               <a:rPr lang="en-GB" smtClean="0"/>
-              <a:t>15/07/2024</a:t>
+              <a:t>16/07/2024</a:t>
             </a:fld>
             <a:endParaRPr lang="en-GB"/>
           </a:p>
@@ -1416,7 +1416,7 @@
           <a:p>
             <a:fld id="{9BA82EC9-1B27-4AE6-A228-67888B3E2E79}" type="datetimeFigureOut">
               <a:rPr lang="en-GB" smtClean="0"/>
-              <a:t>15/07/2024</a:t>
+              <a:t>16/07/2024</a:t>
             </a:fld>
             <a:endParaRPr lang="en-GB"/>
           </a:p>
@@ -1831,7 +1831,7 @@
           <a:p>
             <a:fld id="{9BA82EC9-1B27-4AE6-A228-67888B3E2E79}" type="datetimeFigureOut">
               <a:rPr lang="en-GB" smtClean="0"/>
-              <a:t>15/07/2024</a:t>
+              <a:t>16/07/2024</a:t>
             </a:fld>
             <a:endParaRPr lang="en-GB"/>
           </a:p>
@@ -1973,7 +1973,7 @@
           <a:p>
             <a:fld id="{9BA82EC9-1B27-4AE6-A228-67888B3E2E79}" type="datetimeFigureOut">
               <a:rPr lang="en-GB" smtClean="0"/>
-              <a:t>15/07/2024</a:t>
+              <a:t>16/07/2024</a:t>
             </a:fld>
             <a:endParaRPr lang="en-GB"/>
           </a:p>
@@ -2086,7 +2086,7 @@
           <a:p>
             <a:fld id="{9BA82EC9-1B27-4AE6-A228-67888B3E2E79}" type="datetimeFigureOut">
               <a:rPr lang="en-GB" smtClean="0"/>
-              <a:t>15/07/2024</a:t>
+              <a:t>16/07/2024</a:t>
             </a:fld>
             <a:endParaRPr lang="en-GB"/>
           </a:p>
@@ -2399,7 +2399,7 @@
           <a:p>
             <a:fld id="{9BA82EC9-1B27-4AE6-A228-67888B3E2E79}" type="datetimeFigureOut">
               <a:rPr lang="en-GB" smtClean="0"/>
-              <a:t>15/07/2024</a:t>
+              <a:t>16/07/2024</a:t>
             </a:fld>
             <a:endParaRPr lang="en-GB"/>
           </a:p>
@@ -2688,7 +2688,7 @@
           <a:p>
             <a:fld id="{9BA82EC9-1B27-4AE6-A228-67888B3E2E79}" type="datetimeFigureOut">
               <a:rPr lang="en-GB" smtClean="0"/>
-              <a:t>15/07/2024</a:t>
+              <a:t>16/07/2024</a:t>
             </a:fld>
             <a:endParaRPr lang="en-GB"/>
           </a:p>
@@ -2931,7 +2931,7 @@
           <a:p>
             <a:fld id="{9BA82EC9-1B27-4AE6-A228-67888B3E2E79}" type="datetimeFigureOut">
               <a:rPr lang="en-GB" smtClean="0"/>
-              <a:t>15/07/2024</a:t>
+              <a:t>16/07/2024</a:t>
             </a:fld>
             <a:endParaRPr lang="en-GB"/>
           </a:p>
@@ -5263,21 +5263,21 @@
         </p:nvSpPr>
         <p:spPr>
           <a:xfrm>
-            <a:off x="213510" y="303313"/>
-            <a:ext cx="7545309" cy="733331"/>
+            <a:off x="187042" y="62635"/>
+            <a:ext cx="7545309" cy="640788"/>
           </a:xfrm>
         </p:spPr>
         <p:txBody>
           <a:bodyPr>
-            <a:normAutofit fontScale="90000"/>
+            <a:normAutofit/>
           </a:bodyPr>
           <a:lstStyle/>
           <a:p>
             <a:r>
-              <a:rPr lang="en-US" dirty="0"/>
+              <a:rPr lang="en-US" sz="3600" dirty="0"/>
               <a:t>Solver View Model State Machine</a:t>
             </a:r>
-            <a:endParaRPr lang="en-GB" dirty="0"/>
+            <a:endParaRPr lang="en-GB" sz="3600" dirty="0"/>
           </a:p>
         </p:txBody>
       </p:sp>
@@ -5295,7 +5295,7 @@
         </p:nvSpPr>
         <p:spPr>
           <a:xfrm>
-            <a:off x="1329866" y="3557634"/>
+            <a:off x="2042320" y="2784696"/>
             <a:ext cx="1390941" cy="733331"/>
           </a:xfrm>
           <a:prstGeom prst="roundRect">
@@ -5327,7 +5327,7 @@
           <a:p>
             <a:pPr algn="ctr"/>
             <a:r>
-              <a:rPr lang="en-US" sz="1600" b="1" dirty="0">
+              <a:rPr lang="en-US" sz="1100" b="1" dirty="0">
                 <a:solidFill>
                   <a:schemeClr val="tx1"/>
                 </a:solidFill>
@@ -5338,14 +5338,14 @@
           <a:p>
             <a:pPr algn="ctr"/>
             <a:r>
-              <a:rPr lang="en-US" sz="1100" b="1" dirty="0">
+              <a:rPr lang="en-US" sz="900" b="1" dirty="0">
                 <a:solidFill>
                   <a:schemeClr val="tx1"/>
                 </a:solidFill>
               </a:rPr>
               <a:t>Waiting for User</a:t>
             </a:r>
-            <a:endParaRPr lang="en-GB" sz="1100" b="1" dirty="0">
+            <a:endParaRPr lang="en-GB" sz="900" b="1" dirty="0">
               <a:solidFill>
                 <a:schemeClr val="tx1"/>
               </a:solidFill>
@@ -5367,7 +5367,7 @@
         </p:nvSpPr>
         <p:spPr>
           <a:xfrm>
-            <a:off x="4129429" y="3557634"/>
+            <a:off x="4841883" y="2784696"/>
             <a:ext cx="2250331" cy="733331"/>
           </a:xfrm>
           <a:prstGeom prst="roundRect">
@@ -5399,7 +5399,7 @@
           <a:p>
             <a:pPr algn="ctr"/>
             <a:r>
-              <a:rPr lang="en-US" sz="1600" b="1" dirty="0">
+              <a:rPr lang="en-US" sz="1100" b="1" dirty="0">
                 <a:solidFill>
                   <a:schemeClr val="tx1"/>
                 </a:solidFill>
@@ -5409,7 +5409,7 @@
           </a:p>
           <a:p>
             <a:r>
-              <a:rPr lang="en-US" sz="1100" dirty="0">
+              <a:rPr lang="en-US" sz="900" dirty="0">
                 <a:solidFill>
                   <a:schemeClr val="tx1"/>
                 </a:solidFill>
@@ -5423,7 +5423,7 @@
               <a:buChar char="•"/>
             </a:pPr>
             <a:r>
-              <a:rPr lang="en-US" sz="1100" dirty="0" err="1">
+              <a:rPr lang="en-US" sz="900" dirty="0" err="1">
                 <a:solidFill>
                   <a:schemeClr val="tx1"/>
                 </a:solidFill>
@@ -5431,7 +5431,7 @@
               <a:t>ProgressLevel</a:t>
             </a:r>
             <a:r>
-              <a:rPr lang="en-US" sz="1100" dirty="0">
+              <a:rPr lang="en-US" sz="900" dirty="0">
                 <a:solidFill>
                   <a:schemeClr val="tx1"/>
                 </a:solidFill>
@@ -5459,7 +5459,7 @@
         </p:nvCxnSpPr>
         <p:spPr>
           <a:xfrm>
-            <a:off x="3953740" y="3919139"/>
+            <a:off x="4666194" y="3146201"/>
             <a:ext cx="175689" cy="5161"/>
           </a:xfrm>
           <a:prstGeom prst="straightConnector1">
@@ -5498,7 +5498,7 @@
         </p:nvSpPr>
         <p:spPr>
           <a:xfrm>
-            <a:off x="7216241" y="2077392"/>
+            <a:off x="7928695" y="1304454"/>
             <a:ext cx="3835651" cy="1883121"/>
           </a:xfrm>
           <a:prstGeom prst="roundRect">
@@ -5530,7 +5530,7 @@
           <a:p>
             <a:pPr algn="ctr"/>
             <a:r>
-              <a:rPr lang="en-US" sz="1600" b="1" dirty="0">
+              <a:rPr lang="en-US" sz="1100" b="1" dirty="0">
                 <a:solidFill>
                   <a:schemeClr val="tx1"/>
                 </a:solidFill>
@@ -5541,7 +5541,7 @@
           <a:p>
             <a:pPr algn="ctr"/>
             <a:r>
-              <a:rPr lang="en-US" sz="1100" b="1" dirty="0" err="1">
+              <a:rPr lang="en-US" sz="900" b="1" dirty="0" err="1">
                 <a:solidFill>
                   <a:schemeClr val="tx1"/>
                 </a:solidFill>
@@ -5549,7 +5549,7 @@
               <a:t>SolutionFound</a:t>
             </a:r>
             <a:r>
-              <a:rPr lang="en-US" sz="1100" b="1" dirty="0">
+              <a:rPr lang="en-US" sz="900" b="1" dirty="0">
                 <a:solidFill>
                   <a:schemeClr val="tx1"/>
                 </a:solidFill>
@@ -5557,7 +5557,7 @@
               <a:t> – </a:t>
             </a:r>
             <a:r>
-              <a:rPr lang="en-US" sz="1100" dirty="0">
+              <a:rPr lang="en-US" sz="900" dirty="0">
                 <a:solidFill>
                   <a:schemeClr val="tx1"/>
                 </a:solidFill>
@@ -5567,7 +5567,7 @@
           </a:p>
           <a:p>
             <a:pPr algn="ctr"/>
-            <a:endParaRPr lang="en-US" sz="1100" b="1" dirty="0">
+            <a:endParaRPr lang="en-US" sz="900" b="1" dirty="0">
               <a:solidFill>
                 <a:schemeClr val="tx1"/>
               </a:solidFill>
@@ -5575,7 +5575,7 @@
           </a:p>
           <a:p>
             <a:r>
-              <a:rPr lang="en-US" sz="1100" dirty="0">
+              <a:rPr lang="en-US" sz="900" dirty="0">
                 <a:solidFill>
                   <a:schemeClr val="tx1"/>
                 </a:solidFill>
@@ -5589,7 +5589,7 @@
               <a:buChar char="•"/>
             </a:pPr>
             <a:r>
-              <a:rPr lang="en-US" sz="1100" dirty="0" err="1">
+              <a:rPr lang="en-US" sz="900" dirty="0" err="1">
                 <a:solidFill>
                   <a:schemeClr val="tx1"/>
                 </a:solidFill>
@@ -5597,14 +5597,14 @@
               <a:t>WinningDirection</a:t>
             </a:r>
             <a:r>
-              <a:rPr lang="en-US" sz="1100" dirty="0">
+              <a:rPr lang="en-US" sz="900" dirty="0">
                 <a:solidFill>
                   <a:schemeClr val="tx1"/>
                 </a:solidFill>
               </a:rPr>
               <a:t> –Ball direction that lead to a win</a:t>
             </a:r>
-            <a:endParaRPr lang="en-US" sz="1200" dirty="0">
+            <a:endParaRPr lang="en-US" sz="1000" dirty="0">
               <a:solidFill>
                 <a:schemeClr val="tx1"/>
               </a:solidFill>
@@ -5616,7 +5616,7 @@
               <a:buChar char="•"/>
             </a:pPr>
             <a:r>
-              <a:rPr lang="en-US" sz="1100" dirty="0" err="1">
+              <a:rPr lang="en-US" sz="900" dirty="0" err="1">
                 <a:solidFill>
                   <a:schemeClr val="tx1"/>
                 </a:solidFill>
@@ -5624,14 +5624,14 @@
               <a:t>MovingChain</a:t>
             </a:r>
             <a:r>
-              <a:rPr lang="en-US" sz="1100" dirty="0">
+              <a:rPr lang="en-US" sz="900" dirty="0">
                 <a:solidFill>
                   <a:schemeClr val="tx1"/>
                 </a:solidFill>
               </a:rPr>
               <a:t> – Ball position to move from that lead to a win. It may contain multiple ball position if there are adjacent balls</a:t>
             </a:r>
-            <a:endParaRPr lang="en-GB" sz="1200" dirty="0">
+            <a:endParaRPr lang="en-GB" sz="1000" dirty="0">
               <a:solidFill>
                 <a:schemeClr val="tx1"/>
               </a:solidFill>
@@ -5653,7 +5653,7 @@
         </p:nvSpPr>
         <p:spPr>
           <a:xfrm>
-            <a:off x="7292443" y="4290965"/>
+            <a:off x="8004897" y="3518027"/>
             <a:ext cx="3835651" cy="1545878"/>
           </a:xfrm>
           <a:prstGeom prst="roundRect">
@@ -5685,7 +5685,7 @@
           <a:p>
             <a:pPr algn="ctr"/>
             <a:r>
-              <a:rPr lang="en-US" sz="1600" b="1" dirty="0">
+              <a:rPr lang="en-US" sz="1100" b="1" dirty="0">
                 <a:solidFill>
                   <a:schemeClr val="tx1"/>
                 </a:solidFill>
@@ -5696,7 +5696,7 @@
           <a:p>
             <a:pPr algn="ctr"/>
             <a:r>
-              <a:rPr lang="en-US" sz="1100" b="1" dirty="0" err="1">
+              <a:rPr lang="en-US" sz="900" b="1" dirty="0" err="1">
                 <a:solidFill>
                   <a:schemeClr val="tx1"/>
                 </a:solidFill>
@@ -5704,7 +5704,7 @@
               <a:t>NoSolutionFound</a:t>
             </a:r>
             <a:r>
-              <a:rPr lang="en-US" sz="1100" b="1" dirty="0">
+              <a:rPr lang="en-US" sz="900" b="1" dirty="0">
                 <a:solidFill>
                   <a:schemeClr val="tx1"/>
                 </a:solidFill>
@@ -5712,7 +5712,7 @@
               <a:t> – </a:t>
             </a:r>
             <a:r>
-              <a:rPr lang="en-US" sz="1100" dirty="0">
+              <a:rPr lang="en-US" sz="900" dirty="0">
                 <a:solidFill>
                   <a:schemeClr val="tx1"/>
                 </a:solidFill>
@@ -5722,7 +5722,7 @@
           </a:p>
           <a:p>
             <a:pPr algn="ctr"/>
-            <a:endParaRPr lang="en-US" sz="1100" b="1" dirty="0">
+            <a:endParaRPr lang="en-US" sz="900" b="1" dirty="0">
               <a:solidFill>
                 <a:schemeClr val="tx1"/>
               </a:solidFill>
@@ -5730,7 +5730,7 @@
           </a:p>
           <a:p>
             <a:r>
-              <a:rPr lang="en-GB" sz="1100" dirty="0">
+              <a:rPr lang="en-GB" sz="900" dirty="0">
                 <a:solidFill>
                   <a:schemeClr val="tx1"/>
                 </a:solidFill>
@@ -5738,7 +5738,7 @@
               <a:t>Data </a:t>
             </a:r>
             <a:r>
-              <a:rPr lang="en-GB" sz="1100" dirty="0" err="1">
+              <a:rPr lang="en-GB" sz="900" dirty="0" err="1">
                 <a:solidFill>
                   <a:schemeClr val="tx1"/>
                 </a:solidFill>
@@ -5746,7 +5746,7 @@
               <a:t>Structue</a:t>
             </a:r>
             <a:r>
-              <a:rPr lang="en-GB" sz="1100" dirty="0">
+              <a:rPr lang="en-GB" sz="900" dirty="0">
                 <a:solidFill>
                   <a:schemeClr val="tx1"/>
                 </a:solidFill>
@@ -5760,7 +5760,7 @@
               <a:buChar char="•"/>
             </a:pPr>
             <a:r>
-              <a:rPr lang="en-GB" sz="1100" dirty="0" err="1">
+              <a:rPr lang="en-GB" sz="900" dirty="0" err="1">
                 <a:solidFill>
                   <a:schemeClr val="tx1"/>
                 </a:solidFill>
@@ -5768,7 +5768,7 @@
               <a:t>WinningDirection</a:t>
             </a:r>
             <a:r>
-              <a:rPr lang="en-GB" sz="1100" dirty="0">
+              <a:rPr lang="en-GB" sz="900" dirty="0">
                 <a:solidFill>
                   <a:schemeClr val="tx1"/>
                 </a:solidFill>
@@ -5782,7 +5782,7 @@
               <a:buChar char="•"/>
             </a:pPr>
             <a:r>
-              <a:rPr lang="en-GB" sz="1100" dirty="0" err="1">
+              <a:rPr lang="en-GB" sz="900" dirty="0" err="1">
                 <a:solidFill>
                   <a:schemeClr val="tx1"/>
                 </a:solidFill>
@@ -5790,7 +5790,7 @@
               <a:t>MovingChain</a:t>
             </a:r>
             <a:r>
-              <a:rPr lang="en-GB" sz="1100" dirty="0">
+              <a:rPr lang="en-GB" sz="900" dirty="0">
                 <a:solidFill>
                   <a:schemeClr val="tx1"/>
                 </a:solidFill>
@@ -5800,7 +5800,7 @@
           </a:p>
           <a:p>
             <a:pPr algn="ctr"/>
-            <a:endParaRPr lang="en-GB" sz="1100" b="1" dirty="0">
+            <a:endParaRPr lang="en-GB" sz="900" b="1" dirty="0">
               <a:solidFill>
                 <a:schemeClr val="tx1"/>
               </a:solidFill>
@@ -5826,7 +5826,7 @@
         </p:nvCxnSpPr>
         <p:spPr>
           <a:xfrm flipV="1">
-            <a:off x="6379760" y="3018953"/>
+            <a:off x="7092214" y="2246015"/>
             <a:ext cx="836481" cy="905347"/>
           </a:xfrm>
           <a:prstGeom prst="straightConnector1">
@@ -5869,7 +5869,7 @@
         </p:nvCxnSpPr>
         <p:spPr>
           <a:xfrm>
-            <a:off x="6379760" y="3924300"/>
+            <a:off x="7092214" y="3151362"/>
             <a:ext cx="912683" cy="1139604"/>
           </a:xfrm>
           <a:prstGeom prst="straightConnector1">
@@ -5912,7 +5912,7 @@
         </p:nvCxnSpPr>
         <p:spPr>
           <a:xfrm flipH="1" flipV="1">
-            <a:off x="2025337" y="4290965"/>
+            <a:off x="2737791" y="3518027"/>
             <a:ext cx="9102757" cy="772939"/>
           </a:xfrm>
           <a:prstGeom prst="bentConnector4">
@@ -5958,7 +5958,7 @@
         </p:nvCxnSpPr>
         <p:spPr>
           <a:xfrm flipH="1" flipV="1">
-            <a:off x="5770160" y="1838668"/>
+            <a:off x="6482614" y="1065730"/>
             <a:ext cx="5281732" cy="1180285"/>
           </a:xfrm>
           <a:prstGeom prst="bentConnector3">
@@ -5987,10 +5987,10 @@
       </p:cxnSp>
       <p:sp>
         <p:nvSpPr>
-          <p:cNvPr id="7" name="Rectangle 6">
-            <a:extLst>
-              <a:ext uri="{FF2B5EF4-FFF2-40B4-BE49-F238E27FC236}">
-                <a16:creationId xmlns:a16="http://schemas.microsoft.com/office/drawing/2014/main" id="{A783A18B-4AAA-11EE-997B-EF0CD4647CF8}"/>
+          <p:cNvPr id="9" name="Rectangle 8">
+            <a:extLst>
+              <a:ext uri="{FF2B5EF4-FFF2-40B4-BE49-F238E27FC236}">
+                <a16:creationId xmlns:a16="http://schemas.microsoft.com/office/drawing/2014/main" id="{32D6E5FA-83F4-4A8D-7346-34DDAA2DB2FC}"/>
               </a:ext>
             </a:extLst>
           </p:cNvPr>
@@ -5999,7 +5999,7 @@
         </p:nvSpPr>
         <p:spPr>
           <a:xfrm>
-            <a:off x="297517" y="3695700"/>
+            <a:off x="3270571" y="1879350"/>
             <a:ext cx="734830" cy="450850"/>
           </a:xfrm>
           <a:prstGeom prst="rect">
@@ -6034,19 +6034,19 @@
           <a:p>
             <a:pPr algn="ctr"/>
             <a:r>
-              <a:rPr lang="en-US" sz="1100" dirty="0"/>
-              <a:t>Start Game</a:t>
-            </a:r>
-            <a:endParaRPr lang="en-GB" sz="1100" dirty="0"/>
-          </a:p>
-        </p:txBody>
-      </p:sp>
-      <p:sp>
-        <p:nvSpPr>
-          <p:cNvPr id="9" name="Rectangle 8">
-            <a:extLst>
-              <a:ext uri="{FF2B5EF4-FFF2-40B4-BE49-F238E27FC236}">
-                <a16:creationId xmlns:a16="http://schemas.microsoft.com/office/drawing/2014/main" id="{32D6E5FA-83F4-4A8D-7346-34DDAA2DB2FC}"/>
+              <a:rPr lang="en-US" sz="900" dirty="0"/>
+              <a:t>Toggle Ball</a:t>
+            </a:r>
+            <a:endParaRPr lang="en-GB" sz="900" dirty="0"/>
+          </a:p>
+        </p:txBody>
+      </p:sp>
+      <p:sp>
+        <p:nvSpPr>
+          <p:cNvPr id="16" name="Rectangle 15">
+            <a:extLst>
+              <a:ext uri="{FF2B5EF4-FFF2-40B4-BE49-F238E27FC236}">
+                <a16:creationId xmlns:a16="http://schemas.microsoft.com/office/drawing/2014/main" id="{9CA18DFB-E3D5-8E9A-09D1-992FB8BDA6A6}"/>
               </a:ext>
             </a:extLst>
           </p:cNvPr>
@@ -6055,7 +6055,7 @@
         </p:nvSpPr>
         <p:spPr>
           <a:xfrm>
-            <a:off x="2558117" y="2652288"/>
+            <a:off x="3065846" y="3851569"/>
             <a:ext cx="734830" cy="450850"/>
           </a:xfrm>
           <a:prstGeom prst="rect">
@@ -6090,19 +6090,148 @@
           <a:p>
             <a:pPr algn="ctr"/>
             <a:r>
-              <a:rPr lang="en-US" sz="1100" dirty="0"/>
-              <a:t>Toggle Ball</a:t>
-            </a:r>
-            <a:endParaRPr lang="en-GB" sz="1100" dirty="0"/>
-          </a:p>
-        </p:txBody>
-      </p:sp>
-      <p:sp>
-        <p:nvSpPr>
-          <p:cNvPr id="16" name="Rectangle 15">
-            <a:extLst>
-              <a:ext uri="{FF2B5EF4-FFF2-40B4-BE49-F238E27FC236}">
-                <a16:creationId xmlns:a16="http://schemas.microsoft.com/office/drawing/2014/main" id="{9CA18DFB-E3D5-8E9A-09D1-992FB8BDA6A6}"/>
+              <a:rPr lang="en-US" sz="900" dirty="0"/>
+              <a:t>Reset</a:t>
+            </a:r>
+            <a:endParaRPr lang="en-GB" sz="900" dirty="0"/>
+          </a:p>
+        </p:txBody>
+      </p:sp>
+      <p:cxnSp>
+        <p:nvCxnSpPr>
+          <p:cNvPr id="17" name="Straight Arrow Connector 16">
+            <a:extLst>
+              <a:ext uri="{FF2B5EF4-FFF2-40B4-BE49-F238E27FC236}">
+                <a16:creationId xmlns:a16="http://schemas.microsoft.com/office/drawing/2014/main" id="{E8308163-BDEB-8CC7-C64D-7C553108F250}"/>
+              </a:ext>
+            </a:extLst>
+          </p:cNvPr>
+          <p:cNvCxnSpPr>
+            <a:cxnSpLocks/>
+            <a:stCxn id="7" idx="3"/>
+            <a:endCxn id="4" idx="1"/>
+          </p:cNvCxnSpPr>
+          <p:nvPr/>
+        </p:nvCxnSpPr>
+        <p:spPr>
+          <a:xfrm>
+            <a:off x="1781533" y="3146201"/>
+            <a:ext cx="260787" cy="5161"/>
+          </a:xfrm>
+          <a:prstGeom prst="straightConnector1">
+            <a:avLst/>
+          </a:prstGeom>
+          <a:ln>
+            <a:tailEnd type="triangle"/>
+          </a:ln>
+        </p:spPr>
+        <p:style>
+          <a:lnRef idx="2">
+            <a:schemeClr val="accent1"/>
+          </a:lnRef>
+          <a:fillRef idx="0">
+            <a:schemeClr val="accent1"/>
+          </a:fillRef>
+          <a:effectRef idx="1">
+            <a:schemeClr val="accent1"/>
+          </a:effectRef>
+          <a:fontRef idx="minor">
+            <a:schemeClr val="tx1"/>
+          </a:fontRef>
+        </p:style>
+      </p:cxnSp>
+      <p:cxnSp>
+        <p:nvCxnSpPr>
+          <p:cNvPr id="20" name="Straight Arrow Connector 19">
+            <a:extLst>
+              <a:ext uri="{FF2B5EF4-FFF2-40B4-BE49-F238E27FC236}">
+                <a16:creationId xmlns:a16="http://schemas.microsoft.com/office/drawing/2014/main" id="{29720F0E-A38C-11DD-1505-B4567F829E0A}"/>
+              </a:ext>
+            </a:extLst>
+          </p:cNvPr>
+          <p:cNvCxnSpPr>
+            <a:cxnSpLocks/>
+            <a:endCxn id="9" idx="2"/>
+          </p:cNvCxnSpPr>
+          <p:nvPr/>
+        </p:nvCxnSpPr>
+        <p:spPr>
+          <a:xfrm flipV="1">
+            <a:off x="3194369" y="2330200"/>
+            <a:ext cx="443617" cy="439157"/>
+          </a:xfrm>
+          <a:prstGeom prst="straightConnector1">
+            <a:avLst/>
+          </a:prstGeom>
+          <a:ln>
+            <a:headEnd type="triangle"/>
+            <a:tailEnd type="triangle"/>
+          </a:ln>
+        </p:spPr>
+        <p:style>
+          <a:lnRef idx="2">
+            <a:schemeClr val="accent1"/>
+          </a:lnRef>
+          <a:fillRef idx="0">
+            <a:schemeClr val="accent1"/>
+          </a:fillRef>
+          <a:effectRef idx="1">
+            <a:schemeClr val="accent1"/>
+          </a:effectRef>
+          <a:fontRef idx="minor">
+            <a:schemeClr val="tx1"/>
+          </a:fontRef>
+        </p:style>
+      </p:cxnSp>
+      <p:cxnSp>
+        <p:nvCxnSpPr>
+          <p:cNvPr id="25" name="Straight Arrow Connector 24">
+            <a:extLst>
+              <a:ext uri="{FF2B5EF4-FFF2-40B4-BE49-F238E27FC236}">
+                <a16:creationId xmlns:a16="http://schemas.microsoft.com/office/drawing/2014/main" id="{B6D028EE-EDCA-ED98-DBEC-56404DC788DB}"/>
+              </a:ext>
+            </a:extLst>
+          </p:cNvPr>
+          <p:cNvCxnSpPr>
+            <a:cxnSpLocks/>
+            <a:endCxn id="16" idx="0"/>
+          </p:cNvCxnSpPr>
+          <p:nvPr/>
+        </p:nvCxnSpPr>
+        <p:spPr>
+          <a:xfrm>
+            <a:off x="3131804" y="3533366"/>
+            <a:ext cx="301457" cy="318203"/>
+          </a:xfrm>
+          <a:prstGeom prst="straightConnector1">
+            <a:avLst/>
+          </a:prstGeom>
+          <a:ln>
+            <a:headEnd type="triangle"/>
+            <a:tailEnd type="triangle"/>
+          </a:ln>
+        </p:spPr>
+        <p:style>
+          <a:lnRef idx="2">
+            <a:schemeClr val="accent1"/>
+          </a:lnRef>
+          <a:fillRef idx="0">
+            <a:schemeClr val="accent1"/>
+          </a:fillRef>
+          <a:effectRef idx="1">
+            <a:schemeClr val="accent1"/>
+          </a:effectRef>
+          <a:fontRef idx="minor">
+            <a:schemeClr val="tx1"/>
+          </a:fontRef>
+        </p:style>
+      </p:cxnSp>
+      <p:sp>
+        <p:nvSpPr>
+          <p:cNvPr id="28" name="Rectangle 27">
+            <a:extLst>
+              <a:ext uri="{FF2B5EF4-FFF2-40B4-BE49-F238E27FC236}">
+                <a16:creationId xmlns:a16="http://schemas.microsoft.com/office/drawing/2014/main" id="{0FC80B8D-8D6C-F419-9956-FF87B79737EB}"/>
               </a:ext>
             </a:extLst>
           </p:cNvPr>
@@ -6111,8 +6240,8 @@
         </p:nvSpPr>
         <p:spPr>
           <a:xfrm>
-            <a:off x="2353392" y="4624507"/>
-            <a:ext cx="734830" cy="450850"/>
+            <a:off x="3608950" y="2920776"/>
+            <a:ext cx="1057244" cy="450850"/>
           </a:xfrm>
           <a:prstGeom prst="rect">
             <a:avLst/>
@@ -6146,33 +6275,31 @@
           <a:p>
             <a:pPr algn="ctr"/>
             <a:r>
-              <a:rPr lang="en-US" sz="1100" dirty="0"/>
-              <a:t>Reset</a:t>
-            </a:r>
-            <a:endParaRPr lang="en-GB" sz="1100" dirty="0"/>
+              <a:rPr lang="en-US" sz="900" dirty="0"/>
+              <a:t>Find winning move</a:t>
+            </a:r>
+            <a:endParaRPr lang="en-GB" sz="900" dirty="0"/>
           </a:p>
         </p:txBody>
       </p:sp>
       <p:cxnSp>
         <p:nvCxnSpPr>
-          <p:cNvPr id="17" name="Straight Arrow Connector 16">
-            <a:extLst>
-              <a:ext uri="{FF2B5EF4-FFF2-40B4-BE49-F238E27FC236}">
-                <a16:creationId xmlns:a16="http://schemas.microsoft.com/office/drawing/2014/main" id="{E8308163-BDEB-8CC7-C64D-7C553108F250}"/>
+          <p:cNvPr id="33" name="Straight Arrow Connector 32">
+            <a:extLst>
+              <a:ext uri="{FF2B5EF4-FFF2-40B4-BE49-F238E27FC236}">
+                <a16:creationId xmlns:a16="http://schemas.microsoft.com/office/drawing/2014/main" id="{AA5DFA95-D7B1-EF10-D778-C3D5A09EB32D}"/>
               </a:ext>
             </a:extLst>
           </p:cNvPr>
           <p:cNvCxnSpPr>
             <a:cxnSpLocks/>
-            <a:stCxn id="7" idx="3"/>
-            <a:endCxn id="4" idx="1"/>
           </p:cNvCxnSpPr>
           <p:nvPr/>
         </p:nvCxnSpPr>
         <p:spPr>
           <a:xfrm>
-            <a:off x="1032347" y="3921125"/>
-            <a:ext cx="297519" cy="3175"/>
+            <a:off x="3433261" y="3152902"/>
+            <a:ext cx="175689" cy="5161"/>
           </a:xfrm>
           <a:prstGeom prst="straightConnector1">
             <a:avLst/>
@@ -6198,29 +6325,28 @@
       </p:cxnSp>
       <p:cxnSp>
         <p:nvCxnSpPr>
-          <p:cNvPr id="20" name="Straight Arrow Connector 19">
-            <a:extLst>
-              <a:ext uri="{FF2B5EF4-FFF2-40B4-BE49-F238E27FC236}">
-                <a16:creationId xmlns:a16="http://schemas.microsoft.com/office/drawing/2014/main" id="{29720F0E-A38C-11DD-1505-B4567F829E0A}"/>
+          <p:cNvPr id="35" name="Straight Arrow Connector 34">
+            <a:extLst>
+              <a:ext uri="{FF2B5EF4-FFF2-40B4-BE49-F238E27FC236}">
+                <a16:creationId xmlns:a16="http://schemas.microsoft.com/office/drawing/2014/main" id="{4352139A-EC59-A98A-C8FC-55DC4FF44395}"/>
               </a:ext>
             </a:extLst>
           </p:cNvPr>
           <p:cNvCxnSpPr>
             <a:cxnSpLocks/>
-            <a:endCxn id="9" idx="2"/>
+            <a:endCxn id="32" idx="2"/>
           </p:cNvCxnSpPr>
           <p:nvPr/>
         </p:nvCxnSpPr>
         <p:spPr>
-          <a:xfrm flipV="1">
-            <a:off x="2481915" y="3103138"/>
-            <a:ext cx="443617" cy="439157"/>
+          <a:xfrm flipH="1" flipV="1">
+            <a:off x="1732231" y="2028476"/>
+            <a:ext cx="869358" cy="823045"/>
           </a:xfrm>
           <a:prstGeom prst="straightConnector1">
             <a:avLst/>
           </a:prstGeom>
           <a:ln>
-            <a:headEnd type="triangle"/>
             <a:tailEnd type="triangle"/>
           </a:ln>
         </p:spPr>
@@ -6239,55 +6365,12 @@
           </a:fontRef>
         </p:style>
       </p:cxnSp>
-      <p:cxnSp>
-        <p:nvCxnSpPr>
-          <p:cNvPr id="25" name="Straight Arrow Connector 24">
-            <a:extLst>
-              <a:ext uri="{FF2B5EF4-FFF2-40B4-BE49-F238E27FC236}">
-                <a16:creationId xmlns:a16="http://schemas.microsoft.com/office/drawing/2014/main" id="{B6D028EE-EDCA-ED98-DBEC-56404DC788DB}"/>
-              </a:ext>
-            </a:extLst>
-          </p:cNvPr>
-          <p:cNvCxnSpPr>
-            <a:cxnSpLocks/>
-            <a:endCxn id="16" idx="0"/>
-          </p:cNvCxnSpPr>
-          <p:nvPr/>
-        </p:nvCxnSpPr>
-        <p:spPr>
-          <a:xfrm>
-            <a:off x="2419350" y="4306304"/>
-            <a:ext cx="301457" cy="318203"/>
-          </a:xfrm>
-          <a:prstGeom prst="straightConnector1">
-            <a:avLst/>
-          </a:prstGeom>
-          <a:ln>
-            <a:headEnd type="triangle"/>
-            <a:tailEnd type="triangle"/>
-          </a:ln>
-        </p:spPr>
-        <p:style>
-          <a:lnRef idx="2">
-            <a:schemeClr val="accent1"/>
-          </a:lnRef>
-          <a:fillRef idx="0">
-            <a:schemeClr val="accent1"/>
-          </a:fillRef>
-          <a:effectRef idx="1">
-            <a:schemeClr val="accent1"/>
-          </a:effectRef>
-          <a:fontRef idx="minor">
-            <a:schemeClr val="tx1"/>
-          </a:fontRef>
-        </p:style>
-      </p:cxnSp>
-      <p:sp>
-        <p:nvSpPr>
-          <p:cNvPr id="28" name="Rectangle 27">
-            <a:extLst>
-              <a:ext uri="{FF2B5EF4-FFF2-40B4-BE49-F238E27FC236}">
-                <a16:creationId xmlns:a16="http://schemas.microsoft.com/office/drawing/2014/main" id="{0FC80B8D-8D6C-F419-9956-FF87B79737EB}"/>
+      <p:sp>
+        <p:nvSpPr>
+          <p:cNvPr id="39" name="Rectangle 38">
+            <a:extLst>
+              <a:ext uri="{FF2B5EF4-FFF2-40B4-BE49-F238E27FC236}">
+                <a16:creationId xmlns:a16="http://schemas.microsoft.com/office/drawing/2014/main" id="{A488A4E3-E4C7-26AC-CBCE-BA603022E177}"/>
               </a:ext>
             </a:extLst>
           </p:cNvPr>
@@ -6296,8 +6379,8 @@
         </p:nvSpPr>
         <p:spPr>
           <a:xfrm>
-            <a:off x="2896496" y="3693714"/>
-            <a:ext cx="1057244" cy="450850"/>
+            <a:off x="5205597" y="1631153"/>
+            <a:ext cx="1520974" cy="450850"/>
           </a:xfrm>
           <a:prstGeom prst="rect">
             <a:avLst/>
@@ -6331,60 +6414,19 @@
           <a:p>
             <a:pPr algn="ctr"/>
             <a:r>
-              <a:rPr lang="en-US" sz="1100" dirty="0"/>
-              <a:t>Find winning move</a:t>
-            </a:r>
-            <a:endParaRPr lang="en-GB" sz="1100" dirty="0"/>
-          </a:p>
-        </p:txBody>
-      </p:sp>
-      <p:cxnSp>
-        <p:nvCxnSpPr>
-          <p:cNvPr id="33" name="Straight Arrow Connector 32">
-            <a:extLst>
-              <a:ext uri="{FF2B5EF4-FFF2-40B4-BE49-F238E27FC236}">
-                <a16:creationId xmlns:a16="http://schemas.microsoft.com/office/drawing/2014/main" id="{AA5DFA95-D7B1-EF10-D778-C3D5A09EB32D}"/>
-              </a:ext>
-            </a:extLst>
-          </p:cNvPr>
-          <p:cNvCxnSpPr>
-            <a:cxnSpLocks/>
-          </p:cNvCxnSpPr>
-          <p:nvPr/>
-        </p:nvCxnSpPr>
-        <p:spPr>
-          <a:xfrm>
-            <a:off x="2720807" y="3925840"/>
-            <a:ext cx="175689" cy="5161"/>
-          </a:xfrm>
-          <a:prstGeom prst="straightConnector1">
-            <a:avLst/>
-          </a:prstGeom>
-          <a:ln>
-            <a:tailEnd type="triangle"/>
-          </a:ln>
-        </p:spPr>
-        <p:style>
-          <a:lnRef idx="2">
-            <a:schemeClr val="accent1"/>
-          </a:lnRef>
-          <a:fillRef idx="0">
-            <a:schemeClr val="accent1"/>
-          </a:fillRef>
-          <a:effectRef idx="1">
-            <a:schemeClr val="accent1"/>
-          </a:effectRef>
-          <a:fontRef idx="minor">
-            <a:schemeClr val="tx1"/>
-          </a:fontRef>
-        </p:style>
-      </p:cxnSp>
-      <p:sp>
-        <p:nvSpPr>
-          <p:cNvPr id="34" name="Rectangle 33">
-            <a:extLst>
-              <a:ext uri="{FF2B5EF4-FFF2-40B4-BE49-F238E27FC236}">
-                <a16:creationId xmlns:a16="http://schemas.microsoft.com/office/drawing/2014/main" id="{BE69C9C8-217B-7AB5-687A-24B6A4B4F27F}"/>
+              <a:rPr lang="en-US" sz="900" dirty="0"/>
+              <a:t>Make move and find next winning move</a:t>
+            </a:r>
+            <a:endParaRPr lang="en-GB" sz="900" dirty="0"/>
+          </a:p>
+        </p:txBody>
+      </p:sp>
+      <p:sp>
+        <p:nvSpPr>
+          <p:cNvPr id="40" name="Diamond 39">
+            <a:extLst>
+              <a:ext uri="{FF2B5EF4-FFF2-40B4-BE49-F238E27FC236}">
+                <a16:creationId xmlns:a16="http://schemas.microsoft.com/office/drawing/2014/main" id="{2D3850C9-F49A-10A8-9423-C6318A8CC51F}"/>
               </a:ext>
             </a:extLst>
           </p:cNvPr>
@@ -6393,17 +6435,14 @@
         </p:nvSpPr>
         <p:spPr>
           <a:xfrm>
-            <a:off x="526626" y="4956834"/>
-            <a:ext cx="1011442" cy="450850"/>
-          </a:xfrm>
-          <a:prstGeom prst="rect">
+            <a:off x="5449554" y="703423"/>
+            <a:ext cx="1033060" cy="724614"/>
+          </a:xfrm>
+          <a:prstGeom prst="diamond">
             <a:avLst/>
           </a:prstGeom>
           <a:solidFill>
-            <a:schemeClr val="tx2">
-              <a:lumMod val="50000"/>
-              <a:lumOff val="50000"/>
-            </a:schemeClr>
+            <a:srgbClr val="FFFF00"/>
           </a:solidFill>
         </p:spPr>
         <p:style>
@@ -6428,169 +6467,14 @@
           <a:p>
             <a:pPr algn="ctr"/>
             <a:r>
-              <a:rPr lang="en-US" sz="1100" dirty="0"/>
-              <a:t>Exit / </a:t>
-            </a:r>
-            <a:r>
-              <a:rPr lang="en-US" sz="1100" dirty="0" err="1"/>
-              <a:t>Backpressed</a:t>
-            </a:r>
-            <a:endParaRPr lang="en-GB" sz="1100" dirty="0"/>
-          </a:p>
-        </p:txBody>
-      </p:sp>
-      <p:cxnSp>
-        <p:nvCxnSpPr>
-          <p:cNvPr id="35" name="Straight Arrow Connector 34">
-            <a:extLst>
-              <a:ext uri="{FF2B5EF4-FFF2-40B4-BE49-F238E27FC236}">
-                <a16:creationId xmlns:a16="http://schemas.microsoft.com/office/drawing/2014/main" id="{4352139A-EC59-A98A-C8FC-55DC4FF44395}"/>
-              </a:ext>
-            </a:extLst>
-          </p:cNvPr>
-          <p:cNvCxnSpPr>
-            <a:cxnSpLocks/>
-            <a:endCxn id="34" idx="0"/>
-          </p:cNvCxnSpPr>
-          <p:nvPr/>
-        </p:nvCxnSpPr>
-        <p:spPr>
-          <a:xfrm flipH="1">
-            <a:off x="1032347" y="4284104"/>
-            <a:ext cx="625575" cy="672730"/>
-          </a:xfrm>
-          <a:prstGeom prst="straightConnector1">
-            <a:avLst/>
-          </a:prstGeom>
-          <a:ln>
-            <a:tailEnd type="triangle"/>
-          </a:ln>
-        </p:spPr>
-        <p:style>
-          <a:lnRef idx="2">
-            <a:schemeClr val="accent1"/>
-          </a:lnRef>
-          <a:fillRef idx="0">
-            <a:schemeClr val="accent1"/>
-          </a:fillRef>
-          <a:effectRef idx="1">
-            <a:schemeClr val="accent1"/>
-          </a:effectRef>
-          <a:fontRef idx="minor">
-            <a:schemeClr val="tx1"/>
-          </a:fontRef>
-        </p:style>
-      </p:cxnSp>
-      <p:sp>
-        <p:nvSpPr>
-          <p:cNvPr id="39" name="Rectangle 38">
-            <a:extLst>
-              <a:ext uri="{FF2B5EF4-FFF2-40B4-BE49-F238E27FC236}">
-                <a16:creationId xmlns:a16="http://schemas.microsoft.com/office/drawing/2014/main" id="{A488A4E3-E4C7-26AC-CBCE-BA603022E177}"/>
-              </a:ext>
-            </a:extLst>
-          </p:cNvPr>
-          <p:cNvSpPr/>
-          <p:nvPr/>
-        </p:nvSpPr>
-        <p:spPr>
-          <a:xfrm>
-            <a:off x="4493143" y="2404091"/>
-            <a:ext cx="1520974" cy="450850"/>
-          </a:xfrm>
-          <a:prstGeom prst="rect">
-            <a:avLst/>
-          </a:prstGeom>
-          <a:solidFill>
-            <a:schemeClr val="tx2">
-              <a:lumMod val="50000"/>
-              <a:lumOff val="50000"/>
-            </a:schemeClr>
-          </a:solidFill>
-        </p:spPr>
-        <p:style>
-          <a:lnRef idx="2">
-            <a:schemeClr val="accent1">
-              <a:shade val="15000"/>
-            </a:schemeClr>
-          </a:lnRef>
-          <a:fillRef idx="1">
-            <a:schemeClr val="accent1"/>
-          </a:fillRef>
-          <a:effectRef idx="0">
-            <a:schemeClr val="accent1"/>
-          </a:effectRef>
-          <a:fontRef idx="minor">
-            <a:schemeClr val="lt1"/>
-          </a:fontRef>
-        </p:style>
-        <p:txBody>
-          <a:bodyPr rtlCol="0" anchor="ctr"/>
-          <a:lstStyle/>
-          <a:p>
-            <a:pPr algn="ctr"/>
-            <a:r>
-              <a:rPr lang="en-US" sz="1100" dirty="0"/>
-              <a:t>Make move and find next winning move</a:t>
-            </a:r>
-            <a:endParaRPr lang="en-GB" sz="1100" dirty="0"/>
-          </a:p>
-        </p:txBody>
-      </p:sp>
-      <p:sp>
-        <p:nvSpPr>
-          <p:cNvPr id="40" name="Diamond 39">
-            <a:extLst>
-              <a:ext uri="{FF2B5EF4-FFF2-40B4-BE49-F238E27FC236}">
-                <a16:creationId xmlns:a16="http://schemas.microsoft.com/office/drawing/2014/main" id="{2D3850C9-F49A-10A8-9423-C6318A8CC51F}"/>
-              </a:ext>
-            </a:extLst>
-          </p:cNvPr>
-          <p:cNvSpPr/>
-          <p:nvPr/>
-        </p:nvSpPr>
-        <p:spPr>
-          <a:xfrm>
-            <a:off x="4737100" y="1476361"/>
-            <a:ext cx="1033060" cy="724614"/>
-          </a:xfrm>
-          <a:prstGeom prst="diamond">
-            <a:avLst/>
-          </a:prstGeom>
-          <a:solidFill>
-            <a:srgbClr val="FFFF00"/>
-          </a:solidFill>
-        </p:spPr>
-        <p:style>
-          <a:lnRef idx="2">
-            <a:schemeClr val="accent1">
-              <a:shade val="15000"/>
-            </a:schemeClr>
-          </a:lnRef>
-          <a:fillRef idx="1">
-            <a:schemeClr val="accent1"/>
-          </a:fillRef>
-          <a:effectRef idx="0">
-            <a:schemeClr val="accent1"/>
-          </a:effectRef>
-          <a:fontRef idx="minor">
-            <a:schemeClr val="lt1"/>
-          </a:fontRef>
-        </p:style>
-        <p:txBody>
-          <a:bodyPr rtlCol="0" anchor="ctr"/>
-          <a:lstStyle/>
-          <a:p>
-            <a:pPr algn="ctr"/>
-            <a:r>
-              <a:rPr lang="en-US" sz="1050" dirty="0">
+              <a:rPr lang="en-US" sz="800" dirty="0">
                 <a:solidFill>
                   <a:schemeClr val="tx1"/>
                 </a:solidFill>
               </a:rPr>
               <a:t>One ball left?</a:t>
             </a:r>
-            <a:endParaRPr lang="en-GB" sz="1050" dirty="0">
+            <a:endParaRPr lang="en-GB" sz="800" dirty="0">
               <a:solidFill>
                 <a:schemeClr val="tx1"/>
               </a:solidFill>
@@ -6616,7 +6500,7 @@
         </p:nvCxnSpPr>
         <p:spPr>
           <a:xfrm rot="10800000" flipV="1">
-            <a:off x="2025337" y="1829794"/>
+            <a:off x="2737791" y="1056856"/>
             <a:ext cx="695470" cy="1727839"/>
           </a:xfrm>
           <a:prstGeom prst="bentConnector2">
@@ -6655,8 +6539,8 @@
         </p:nvSpPr>
         <p:spPr>
           <a:xfrm>
-            <a:off x="4457104" y="1567377"/>
-            <a:ext cx="264752" cy="215444"/>
+            <a:off x="5169558" y="794439"/>
+            <a:ext cx="208390" cy="161583"/>
           </a:xfrm>
           <a:prstGeom prst="rect">
             <a:avLst/>
@@ -6670,10 +6554,10 @@
           <a:lstStyle/>
           <a:p>
             <a:r>
-              <a:rPr lang="en-US" sz="1400" dirty="0"/>
+              <a:rPr lang="en-US" sz="1050" dirty="0"/>
               <a:t>Yes</a:t>
             </a:r>
-            <a:endParaRPr lang="en-GB" sz="1400" dirty="0"/>
+            <a:endParaRPr lang="en-GB" sz="1050" dirty="0"/>
           </a:p>
         </p:txBody>
       </p:sp>
@@ -6691,8 +6575,8 @@
         </p:nvSpPr>
         <p:spPr>
           <a:xfrm>
-            <a:off x="5398883" y="2144157"/>
-            <a:ext cx="226024" cy="215444"/>
+            <a:off x="6111337" y="1371219"/>
+            <a:ext cx="168316" cy="161583"/>
           </a:xfrm>
           <a:prstGeom prst="rect">
             <a:avLst/>
@@ -6706,10 +6590,10 @@
           <a:lstStyle/>
           <a:p>
             <a:r>
-              <a:rPr lang="en-US" sz="1400" dirty="0"/>
+              <a:rPr lang="en-US" sz="1050" dirty="0"/>
               <a:t>No</a:t>
             </a:r>
-            <a:endParaRPr lang="en-GB" sz="1400" dirty="0"/>
+            <a:endParaRPr lang="en-GB" sz="1050" dirty="0"/>
           </a:p>
         </p:txBody>
       </p:sp>
@@ -6731,7 +6615,7 @@
         </p:nvCxnSpPr>
         <p:spPr>
           <a:xfrm>
-            <a:off x="5253630" y="2200975"/>
+            <a:off x="5966084" y="1428037"/>
             <a:ext cx="0" cy="203116"/>
           </a:xfrm>
           <a:prstGeom prst="straightConnector1">
@@ -6774,7 +6658,7 @@
         </p:nvCxnSpPr>
         <p:spPr>
           <a:xfrm flipH="1">
-            <a:off x="5251370" y="2854941"/>
+            <a:off x="5963824" y="2082003"/>
             <a:ext cx="2260" cy="154208"/>
           </a:xfrm>
           <a:prstGeom prst="straightConnector1">
@@ -6813,7 +6697,7 @@
         </p:nvSpPr>
         <p:spPr>
           <a:xfrm>
-            <a:off x="2720807" y="1633411"/>
+            <a:off x="3433261" y="860473"/>
             <a:ext cx="834742" cy="392768"/>
           </a:xfrm>
           <a:prstGeom prst="roundRect">
@@ -6845,14 +6729,14 @@
           <a:p>
             <a:pPr algn="ctr"/>
             <a:r>
-              <a:rPr lang="en-US" sz="1100" dirty="0">
+              <a:rPr lang="en-US" sz="900" dirty="0">
                 <a:solidFill>
                   <a:schemeClr val="tx1"/>
                 </a:solidFill>
               </a:rPr>
               <a:t>Victory Message</a:t>
             </a:r>
-            <a:endParaRPr lang="en-GB" sz="1100" dirty="0">
+            <a:endParaRPr lang="en-GB" sz="900" dirty="0">
               <a:solidFill>
                 <a:schemeClr val="tx1"/>
               </a:solidFill>
@@ -6878,7 +6762,7 @@
         </p:nvCxnSpPr>
         <p:spPr>
           <a:xfrm flipH="1" flipV="1">
-            <a:off x="3555549" y="1829795"/>
+            <a:off x="4268003" y="1056857"/>
             <a:ext cx="1181551" cy="8873"/>
           </a:xfrm>
           <a:prstGeom prst="straightConnector1">
@@ -6917,7 +6801,7 @@
         </p:nvSpPr>
         <p:spPr>
           <a:xfrm>
-            <a:off x="4721856" y="3009149"/>
+            <a:off x="5434310" y="2236211"/>
             <a:ext cx="1059027" cy="253861"/>
           </a:xfrm>
           <a:prstGeom prst="roundRect">
@@ -6949,14 +6833,14 @@
           <a:p>
             <a:pPr algn="ctr"/>
             <a:r>
-              <a:rPr lang="en-US" sz="1100" dirty="0">
+              <a:rPr lang="en-US" sz="900" dirty="0">
                 <a:solidFill>
                   <a:schemeClr val="tx1"/>
                 </a:solidFill>
               </a:rPr>
               <a:t>Move the ball</a:t>
             </a:r>
-            <a:endParaRPr lang="en-GB" sz="1100" dirty="0">
+            <a:endParaRPr lang="en-GB" sz="900" dirty="0">
               <a:solidFill>
                 <a:schemeClr val="tx1"/>
               </a:solidFill>
@@ -6982,7 +6866,7 @@
         </p:nvCxnSpPr>
         <p:spPr>
           <a:xfrm rot="5400000">
-            <a:off x="4122892" y="2565236"/>
+            <a:off x="4835346" y="1792298"/>
             <a:ext cx="430704" cy="1826252"/>
           </a:xfrm>
           <a:prstGeom prst="bentConnector3">
@@ -7023,8 +6907,8 @@
         </p:nvSpPr>
         <p:spPr>
           <a:xfrm>
-            <a:off x="2981887" y="4187179"/>
-            <a:ext cx="886461" cy="92333"/>
+            <a:off x="3694341" y="3414241"/>
+            <a:ext cx="440826" cy="46166"/>
           </a:xfrm>
           <a:prstGeom prst="rect">
             <a:avLst/>
@@ -7038,13 +6922,772 @@
           <a:lstStyle/>
           <a:p>
             <a:r>
-              <a:rPr lang="en-US" sz="600" dirty="0"/>
+              <a:rPr lang="en-US" sz="300" dirty="0"/>
               <a:t>Human &amp; Computer driven</a:t>
             </a:r>
-            <a:endParaRPr lang="en-GB" sz="600" dirty="0"/>
-          </a:p>
-        </p:txBody>
-      </p:sp>
+            <a:endParaRPr lang="en-GB" sz="300" dirty="0"/>
+          </a:p>
+        </p:txBody>
+      </p:sp>
+      <p:sp>
+        <p:nvSpPr>
+          <p:cNvPr id="6" name="Rectangle: Rounded Corners 5">
+            <a:extLst>
+              <a:ext uri="{FF2B5EF4-FFF2-40B4-BE49-F238E27FC236}">
+                <a16:creationId xmlns:a16="http://schemas.microsoft.com/office/drawing/2014/main" id="{A2A8601D-DCF1-A300-B55C-FABD1E96FEFC}"/>
+              </a:ext>
+            </a:extLst>
+          </p:cNvPr>
+          <p:cNvSpPr/>
+          <p:nvPr/>
+        </p:nvSpPr>
+        <p:spPr>
+          <a:xfrm>
+            <a:off x="187042" y="2948096"/>
+            <a:ext cx="724013" cy="392768"/>
+          </a:xfrm>
+          <a:prstGeom prst="roundRect">
+            <a:avLst/>
+          </a:prstGeom>
+          <a:solidFill>
+            <a:schemeClr val="accent2"/>
+          </a:solidFill>
+        </p:spPr>
+        <p:style>
+          <a:lnRef idx="2">
+            <a:schemeClr val="accent1">
+              <a:shade val="15000"/>
+            </a:schemeClr>
+          </a:lnRef>
+          <a:fillRef idx="1">
+            <a:schemeClr val="accent1"/>
+          </a:fillRef>
+          <a:effectRef idx="0">
+            <a:schemeClr val="accent1"/>
+          </a:effectRef>
+          <a:fontRef idx="minor">
+            <a:schemeClr val="lt1"/>
+          </a:fontRef>
+        </p:style>
+        <p:txBody>
+          <a:bodyPr rtlCol="0" anchor="ctr"/>
+          <a:lstStyle/>
+          <a:p>
+            <a:pPr algn="ctr"/>
+            <a:r>
+              <a:rPr lang="en-US" sz="900" dirty="0">
+                <a:solidFill>
+                  <a:schemeClr val="tx1"/>
+                </a:solidFill>
+              </a:rPr>
+              <a:t>Navigate to Solver Screen</a:t>
+            </a:r>
+            <a:endParaRPr lang="en-GB" sz="900" dirty="0">
+              <a:solidFill>
+                <a:schemeClr val="tx1"/>
+              </a:solidFill>
+            </a:endParaRPr>
+          </a:p>
+        </p:txBody>
+      </p:sp>
+      <p:grpSp>
+        <p:nvGrpSpPr>
+          <p:cNvPr id="23" name="Group 22">
+            <a:extLst>
+              <a:ext uri="{FF2B5EF4-FFF2-40B4-BE49-F238E27FC236}">
+                <a16:creationId xmlns:a16="http://schemas.microsoft.com/office/drawing/2014/main" id="{DA83835D-FF08-8D48-4FB6-0D4CBC0580E6}"/>
+              </a:ext>
+            </a:extLst>
+          </p:cNvPr>
+          <p:cNvGrpSpPr/>
+          <p:nvPr/>
+        </p:nvGrpSpPr>
+        <p:grpSpPr>
+          <a:xfrm>
+            <a:off x="1110424" y="2959899"/>
+            <a:ext cx="671109" cy="372604"/>
+            <a:chOff x="975820" y="3732837"/>
+            <a:chExt cx="671109" cy="372604"/>
+          </a:xfrm>
+        </p:grpSpPr>
+        <p:sp>
+          <p:nvSpPr>
+            <p:cNvPr id="7" name="Rectangle 6">
+              <a:extLst>
+                <a:ext uri="{FF2B5EF4-FFF2-40B4-BE49-F238E27FC236}">
+                  <a16:creationId xmlns:a16="http://schemas.microsoft.com/office/drawing/2014/main" id="{A783A18B-4AAA-11EE-997B-EF0CD4647CF8}"/>
+                </a:ext>
+              </a:extLst>
+            </p:cNvPr>
+            <p:cNvSpPr/>
+            <p:nvPr/>
+          </p:nvSpPr>
+          <p:spPr>
+            <a:xfrm>
+              <a:off x="978902" y="3732837"/>
+              <a:ext cx="668027" cy="372604"/>
+            </a:xfrm>
+            <a:prstGeom prst="rect">
+              <a:avLst/>
+            </a:prstGeom>
+            <a:solidFill>
+              <a:schemeClr val="tx2">
+                <a:lumMod val="50000"/>
+                <a:lumOff val="50000"/>
+              </a:schemeClr>
+            </a:solidFill>
+          </p:spPr>
+          <p:style>
+            <a:lnRef idx="2">
+              <a:schemeClr val="accent1">
+                <a:shade val="15000"/>
+              </a:schemeClr>
+            </a:lnRef>
+            <a:fillRef idx="1">
+              <a:schemeClr val="accent1"/>
+            </a:fillRef>
+            <a:effectRef idx="0">
+              <a:schemeClr val="accent1"/>
+            </a:effectRef>
+            <a:fontRef idx="minor">
+              <a:schemeClr val="lt1"/>
+            </a:fontRef>
+          </p:style>
+          <p:txBody>
+            <a:bodyPr lIns="182880" tIns="0" rIns="0" bIns="0" rtlCol="0" anchor="ctr"/>
+            <a:lstStyle/>
+            <a:p>
+              <a:pPr algn="ctr"/>
+              <a:r>
+                <a:rPr lang="en-US" sz="900" dirty="0">
+                  <a:solidFill>
+                    <a:schemeClr val="tx1"/>
+                  </a:solidFill>
+                </a:rPr>
+                <a:t>Start Game</a:t>
+              </a:r>
+              <a:endParaRPr lang="en-GB" sz="900" dirty="0">
+                <a:solidFill>
+                  <a:schemeClr val="tx1"/>
+                </a:solidFill>
+              </a:endParaRPr>
+            </a:p>
+          </p:txBody>
+        </p:sp>
+        <p:pic>
+          <p:nvPicPr>
+            <p:cNvPr id="19" name="Graphic 18" descr="User with solid fill">
+              <a:extLst>
+                <a:ext uri="{FF2B5EF4-FFF2-40B4-BE49-F238E27FC236}">
+                  <a16:creationId xmlns:a16="http://schemas.microsoft.com/office/drawing/2014/main" id="{E32B821F-00DB-78C6-E33A-04E5C12B7166}"/>
+                </a:ext>
+              </a:extLst>
+            </p:cNvPr>
+            <p:cNvPicPr>
+              <a:picLocks noChangeAspect="1"/>
+            </p:cNvPicPr>
+            <p:nvPr/>
+          </p:nvPicPr>
+          <p:blipFill>
+            <a:blip r:embed="rId2">
+              <a:extLst>
+                <a:ext uri="{96DAC541-7B7A-43D3-8B79-37D633B846F1}">
+                  <asvg:svgBlip xmlns:asvg="http://schemas.microsoft.com/office/drawing/2016/SVG/main" r:embed="rId3"/>
+                </a:ext>
+              </a:extLst>
+            </a:blip>
+            <a:stretch>
+              <a:fillRect/>
+            </a:stretch>
+          </p:blipFill>
+          <p:spPr>
+            <a:xfrm>
+              <a:off x="975820" y="3773461"/>
+              <a:ext cx="291356" cy="291356"/>
+            </a:xfrm>
+            <a:prstGeom prst="rect">
+              <a:avLst/>
+            </a:prstGeom>
+          </p:spPr>
+        </p:pic>
+      </p:grpSp>
+      <p:cxnSp>
+        <p:nvCxnSpPr>
+          <p:cNvPr id="24" name="Straight Arrow Connector 23">
+            <a:extLst>
+              <a:ext uri="{FF2B5EF4-FFF2-40B4-BE49-F238E27FC236}">
+                <a16:creationId xmlns:a16="http://schemas.microsoft.com/office/drawing/2014/main" id="{48AE6D95-771A-CF12-9214-343ACBB9B610}"/>
+              </a:ext>
+            </a:extLst>
+          </p:cNvPr>
+          <p:cNvCxnSpPr>
+            <a:cxnSpLocks/>
+            <a:stCxn id="6" idx="3"/>
+            <a:endCxn id="7" idx="1"/>
+          </p:cNvCxnSpPr>
+          <p:nvPr/>
+        </p:nvCxnSpPr>
+        <p:spPr>
+          <a:xfrm>
+            <a:off x="911055" y="3144480"/>
+            <a:ext cx="202451" cy="1721"/>
+          </a:xfrm>
+          <a:prstGeom prst="straightConnector1">
+            <a:avLst/>
+          </a:prstGeom>
+          <a:ln>
+            <a:tailEnd type="triangle"/>
+          </a:ln>
+        </p:spPr>
+        <p:style>
+          <a:lnRef idx="2">
+            <a:schemeClr val="accent1"/>
+          </a:lnRef>
+          <a:fillRef idx="0">
+            <a:schemeClr val="accent1"/>
+          </a:fillRef>
+          <a:effectRef idx="1">
+            <a:schemeClr val="accent1"/>
+          </a:effectRef>
+          <a:fontRef idx="minor">
+            <a:schemeClr val="tx1"/>
+          </a:fontRef>
+        </p:style>
+      </p:cxnSp>
+      <p:grpSp>
+        <p:nvGrpSpPr>
+          <p:cNvPr id="37" name="Group 36">
+            <a:extLst>
+              <a:ext uri="{FF2B5EF4-FFF2-40B4-BE49-F238E27FC236}">
+                <a16:creationId xmlns:a16="http://schemas.microsoft.com/office/drawing/2014/main" id="{CCBF82CF-8FF9-0834-EC6A-BB3A6F434365}"/>
+              </a:ext>
+            </a:extLst>
+          </p:cNvPr>
+          <p:cNvGrpSpPr/>
+          <p:nvPr/>
+        </p:nvGrpSpPr>
+        <p:grpSpPr>
+          <a:xfrm>
+            <a:off x="1242736" y="1655872"/>
+            <a:ext cx="978524" cy="372604"/>
+            <a:chOff x="441412" y="4877603"/>
+            <a:chExt cx="978524" cy="372604"/>
+          </a:xfrm>
+        </p:grpSpPr>
+        <p:sp>
+          <p:nvSpPr>
+            <p:cNvPr id="32" name="Rectangle 31">
+              <a:extLst>
+                <a:ext uri="{FF2B5EF4-FFF2-40B4-BE49-F238E27FC236}">
+                  <a16:creationId xmlns:a16="http://schemas.microsoft.com/office/drawing/2014/main" id="{C6E25DEC-B9A2-6139-01FE-F9176DD6FF7D}"/>
+                </a:ext>
+              </a:extLst>
+            </p:cNvPr>
+            <p:cNvSpPr/>
+            <p:nvPr/>
+          </p:nvSpPr>
+          <p:spPr>
+            <a:xfrm>
+              <a:off x="441878" y="4877603"/>
+              <a:ext cx="978058" cy="372604"/>
+            </a:xfrm>
+            <a:prstGeom prst="rect">
+              <a:avLst/>
+            </a:prstGeom>
+            <a:solidFill>
+              <a:schemeClr val="tx2">
+                <a:lumMod val="50000"/>
+                <a:lumOff val="50000"/>
+              </a:schemeClr>
+            </a:solidFill>
+          </p:spPr>
+          <p:style>
+            <a:lnRef idx="2">
+              <a:schemeClr val="accent1">
+                <a:shade val="15000"/>
+              </a:schemeClr>
+            </a:lnRef>
+            <a:fillRef idx="1">
+              <a:schemeClr val="accent1"/>
+            </a:fillRef>
+            <a:effectRef idx="0">
+              <a:schemeClr val="accent1"/>
+            </a:effectRef>
+            <a:fontRef idx="minor">
+              <a:schemeClr val="lt1"/>
+            </a:fontRef>
+          </p:style>
+          <p:txBody>
+            <a:bodyPr lIns="182880" tIns="0" rIns="0" bIns="0" rtlCol="0" anchor="ctr"/>
+            <a:lstStyle/>
+            <a:p>
+              <a:pPr algn="ctr"/>
+              <a:r>
+                <a:rPr lang="en-US" sz="900" dirty="0">
+                  <a:solidFill>
+                    <a:schemeClr val="tx1"/>
+                  </a:solidFill>
+                </a:rPr>
+                <a:t>Exit Screen / </a:t>
+              </a:r>
+              <a:r>
+                <a:rPr lang="en-US" sz="900" dirty="0" err="1">
+                  <a:solidFill>
+                    <a:schemeClr val="tx1"/>
+                  </a:solidFill>
+                </a:rPr>
+                <a:t>BackPressed</a:t>
+              </a:r>
+              <a:endParaRPr lang="en-GB" sz="900" dirty="0">
+                <a:solidFill>
+                  <a:schemeClr val="tx1"/>
+                </a:solidFill>
+              </a:endParaRPr>
+            </a:p>
+          </p:txBody>
+        </p:sp>
+        <p:pic>
+          <p:nvPicPr>
+            <p:cNvPr id="36" name="Graphic 35" descr="User with solid fill">
+              <a:extLst>
+                <a:ext uri="{FF2B5EF4-FFF2-40B4-BE49-F238E27FC236}">
+                  <a16:creationId xmlns:a16="http://schemas.microsoft.com/office/drawing/2014/main" id="{54314D59-3DDC-1058-1D2A-9127B133FA35}"/>
+                </a:ext>
+              </a:extLst>
+            </p:cNvPr>
+            <p:cNvPicPr>
+              <a:picLocks noChangeAspect="1"/>
+            </p:cNvPicPr>
+            <p:nvPr/>
+          </p:nvPicPr>
+          <p:blipFill>
+            <a:blip r:embed="rId2">
+              <a:extLst>
+                <a:ext uri="{96DAC541-7B7A-43D3-8B79-37D633B846F1}">
+                  <asvg:svgBlip xmlns:asvg="http://schemas.microsoft.com/office/drawing/2016/SVG/main" r:embed="rId3"/>
+                </a:ext>
+              </a:extLst>
+            </a:blip>
+            <a:stretch>
+              <a:fillRect/>
+            </a:stretch>
+          </p:blipFill>
+          <p:spPr>
+            <a:xfrm>
+              <a:off x="441412" y="4918227"/>
+              <a:ext cx="291356" cy="291356"/>
+            </a:xfrm>
+            <a:prstGeom prst="rect">
+              <a:avLst/>
+            </a:prstGeom>
+          </p:spPr>
+        </p:pic>
+      </p:grpSp>
+      <p:sp>
+        <p:nvSpPr>
+          <p:cNvPr id="41" name="Rectangle: Rounded Corners 40">
+            <a:extLst>
+              <a:ext uri="{FF2B5EF4-FFF2-40B4-BE49-F238E27FC236}">
+                <a16:creationId xmlns:a16="http://schemas.microsoft.com/office/drawing/2014/main" id="{53BF12A6-5055-019C-FFA7-6FA26FF3D368}"/>
+              </a:ext>
+            </a:extLst>
+          </p:cNvPr>
+          <p:cNvSpPr/>
+          <p:nvPr/>
+        </p:nvSpPr>
+        <p:spPr>
+          <a:xfrm>
+            <a:off x="218900" y="1642075"/>
+            <a:ext cx="724013" cy="392768"/>
+          </a:xfrm>
+          <a:prstGeom prst="roundRect">
+            <a:avLst/>
+          </a:prstGeom>
+          <a:solidFill>
+            <a:schemeClr val="accent2"/>
+          </a:solidFill>
+        </p:spPr>
+        <p:style>
+          <a:lnRef idx="2">
+            <a:schemeClr val="accent1">
+              <a:shade val="15000"/>
+            </a:schemeClr>
+          </a:lnRef>
+          <a:fillRef idx="1">
+            <a:schemeClr val="accent1"/>
+          </a:fillRef>
+          <a:effectRef idx="0">
+            <a:schemeClr val="accent1"/>
+          </a:effectRef>
+          <a:fontRef idx="minor">
+            <a:schemeClr val="lt1"/>
+          </a:fontRef>
+        </p:style>
+        <p:txBody>
+          <a:bodyPr rtlCol="0" anchor="ctr"/>
+          <a:lstStyle/>
+          <a:p>
+            <a:pPr algn="ctr"/>
+            <a:r>
+              <a:rPr lang="en-US" sz="900" dirty="0">
+                <a:solidFill>
+                  <a:schemeClr val="tx1"/>
+                </a:solidFill>
+              </a:rPr>
+              <a:t>Navigate to Home Screen</a:t>
+            </a:r>
+            <a:endParaRPr lang="en-GB" sz="900" dirty="0">
+              <a:solidFill>
+                <a:schemeClr val="tx1"/>
+              </a:solidFill>
+            </a:endParaRPr>
+          </a:p>
+        </p:txBody>
+      </p:sp>
+      <p:cxnSp>
+        <p:nvCxnSpPr>
+          <p:cNvPr id="43" name="Straight Arrow Connector 42">
+            <a:extLst>
+              <a:ext uri="{FF2B5EF4-FFF2-40B4-BE49-F238E27FC236}">
+                <a16:creationId xmlns:a16="http://schemas.microsoft.com/office/drawing/2014/main" id="{FF981641-96CA-57F1-70A0-7BDA8220B2D9}"/>
+              </a:ext>
+            </a:extLst>
+          </p:cNvPr>
+          <p:cNvCxnSpPr>
+            <a:cxnSpLocks/>
+            <a:stCxn id="32" idx="1"/>
+            <a:endCxn id="41" idx="3"/>
+          </p:cNvCxnSpPr>
+          <p:nvPr/>
+        </p:nvCxnSpPr>
+        <p:spPr>
+          <a:xfrm flipH="1" flipV="1">
+            <a:off x="942913" y="1838459"/>
+            <a:ext cx="300289" cy="3715"/>
+          </a:xfrm>
+          <a:prstGeom prst="straightConnector1">
+            <a:avLst/>
+          </a:prstGeom>
+          <a:ln>
+            <a:tailEnd type="triangle"/>
+          </a:ln>
+        </p:spPr>
+        <p:style>
+          <a:lnRef idx="2">
+            <a:schemeClr val="accent1"/>
+          </a:lnRef>
+          <a:fillRef idx="0">
+            <a:schemeClr val="accent1"/>
+          </a:fillRef>
+          <a:effectRef idx="1">
+            <a:schemeClr val="accent1"/>
+          </a:effectRef>
+          <a:fontRef idx="minor">
+            <a:schemeClr val="tx1"/>
+          </a:fontRef>
+        </p:style>
+      </p:cxnSp>
+      <p:sp>
+        <p:nvSpPr>
+          <p:cNvPr id="49" name="TextBox 48">
+            <a:extLst>
+              <a:ext uri="{FF2B5EF4-FFF2-40B4-BE49-F238E27FC236}">
+                <a16:creationId xmlns:a16="http://schemas.microsoft.com/office/drawing/2014/main" id="{6C1D2156-FA09-1420-41C3-6D6CE4F578B5}"/>
+              </a:ext>
+            </a:extLst>
+          </p:cNvPr>
+          <p:cNvSpPr txBox="1"/>
+          <p:nvPr/>
+        </p:nvSpPr>
+        <p:spPr>
+          <a:xfrm>
+            <a:off x="540855" y="4780638"/>
+            <a:ext cx="552202" cy="184666"/>
+          </a:xfrm>
+          <a:prstGeom prst="rect">
+            <a:avLst/>
+          </a:prstGeom>
+          <a:noFill/>
+        </p:spPr>
+        <p:txBody>
+          <a:bodyPr wrap="none" lIns="0" tIns="0" rIns="0" bIns="0" rtlCol="0">
+            <a:spAutoFit/>
+          </a:bodyPr>
+          <a:lstStyle/>
+          <a:p>
+            <a:r>
+              <a:rPr lang="en-US" sz="1200" b="1" dirty="0"/>
+              <a:t>Legend:</a:t>
+            </a:r>
+            <a:endParaRPr lang="en-GB" sz="1200" b="1" dirty="0"/>
+          </a:p>
+        </p:txBody>
+      </p:sp>
+      <p:sp>
+        <p:nvSpPr>
+          <p:cNvPr id="55" name="Rectangle: Rounded Corners 54">
+            <a:extLst>
+              <a:ext uri="{FF2B5EF4-FFF2-40B4-BE49-F238E27FC236}">
+                <a16:creationId xmlns:a16="http://schemas.microsoft.com/office/drawing/2014/main" id="{4C812CD3-5280-B192-25D9-AAAE8A86FC6A}"/>
+              </a:ext>
+            </a:extLst>
+          </p:cNvPr>
+          <p:cNvSpPr/>
+          <p:nvPr/>
+        </p:nvSpPr>
+        <p:spPr>
+          <a:xfrm>
+            <a:off x="751490" y="5261810"/>
+            <a:ext cx="876055" cy="151429"/>
+          </a:xfrm>
+          <a:prstGeom prst="roundRect">
+            <a:avLst/>
+          </a:prstGeom>
+          <a:solidFill>
+            <a:schemeClr val="accent2"/>
+          </a:solidFill>
+        </p:spPr>
+        <p:style>
+          <a:lnRef idx="2">
+            <a:schemeClr val="accent1">
+              <a:shade val="15000"/>
+            </a:schemeClr>
+          </a:lnRef>
+          <a:fillRef idx="1">
+            <a:schemeClr val="accent1"/>
+          </a:fillRef>
+          <a:effectRef idx="0">
+            <a:schemeClr val="accent1"/>
+          </a:effectRef>
+          <a:fontRef idx="minor">
+            <a:schemeClr val="lt1"/>
+          </a:fontRef>
+        </p:style>
+        <p:txBody>
+          <a:bodyPr lIns="0" tIns="0" rIns="0" bIns="0" rtlCol="0" anchor="ctr"/>
+          <a:lstStyle/>
+          <a:p>
+            <a:pPr algn="ctr"/>
+            <a:r>
+              <a:rPr lang="en-US" sz="700" dirty="0">
+                <a:solidFill>
+                  <a:schemeClr val="tx1"/>
+                </a:solidFill>
+              </a:rPr>
+              <a:t>Computer Action</a:t>
+            </a:r>
+            <a:endParaRPr lang="en-GB" sz="700" dirty="0">
+              <a:solidFill>
+                <a:schemeClr val="tx1"/>
+              </a:solidFill>
+            </a:endParaRPr>
+          </a:p>
+        </p:txBody>
+      </p:sp>
+      <p:sp>
+        <p:nvSpPr>
+          <p:cNvPr id="57" name="Rectangle: Rounded Corners 56">
+            <a:extLst>
+              <a:ext uri="{FF2B5EF4-FFF2-40B4-BE49-F238E27FC236}">
+                <a16:creationId xmlns:a16="http://schemas.microsoft.com/office/drawing/2014/main" id="{F08D1ACB-0A0B-193F-F36F-DA6D88E0FDCB}"/>
+              </a:ext>
+            </a:extLst>
+          </p:cNvPr>
+          <p:cNvSpPr/>
+          <p:nvPr/>
+        </p:nvSpPr>
+        <p:spPr>
+          <a:xfrm>
+            <a:off x="751490" y="5482578"/>
+            <a:ext cx="863665" cy="376316"/>
+          </a:xfrm>
+          <a:prstGeom prst="roundRect">
+            <a:avLst/>
+          </a:prstGeom>
+          <a:solidFill>
+            <a:schemeClr val="bg1"/>
+          </a:solidFill>
+        </p:spPr>
+        <p:style>
+          <a:lnRef idx="2">
+            <a:schemeClr val="accent1">
+              <a:shade val="15000"/>
+            </a:schemeClr>
+          </a:lnRef>
+          <a:fillRef idx="1">
+            <a:schemeClr val="accent1"/>
+          </a:fillRef>
+          <a:effectRef idx="0">
+            <a:schemeClr val="accent1"/>
+          </a:effectRef>
+          <a:fontRef idx="minor">
+            <a:schemeClr val="lt1"/>
+          </a:fontRef>
+        </p:style>
+        <p:txBody>
+          <a:bodyPr lIns="0" tIns="0" rIns="0" bIns="0" rtlCol="0" anchor="ctr"/>
+          <a:lstStyle/>
+          <a:p>
+            <a:pPr algn="ctr"/>
+            <a:r>
+              <a:rPr lang="en-US" sz="1000" b="1" dirty="0">
+                <a:solidFill>
+                  <a:schemeClr val="tx1"/>
+                </a:solidFill>
+              </a:rPr>
+              <a:t>State</a:t>
+            </a:r>
+          </a:p>
+          <a:p>
+            <a:pPr algn="ctr"/>
+            <a:r>
+              <a:rPr lang="en-US" sz="700" b="1" dirty="0">
+                <a:solidFill>
+                  <a:schemeClr val="tx1"/>
+                </a:solidFill>
+              </a:rPr>
+              <a:t>Sub-state</a:t>
+            </a:r>
+          </a:p>
+          <a:p>
+            <a:pPr algn="ctr"/>
+            <a:r>
+              <a:rPr lang="en-US" sz="700" dirty="0">
+                <a:solidFill>
+                  <a:schemeClr val="tx1"/>
+                </a:solidFill>
+              </a:rPr>
+              <a:t>Data Structure Info</a:t>
+            </a:r>
+            <a:endParaRPr lang="en-GB" sz="700" dirty="0">
+              <a:solidFill>
+                <a:schemeClr val="tx1"/>
+              </a:solidFill>
+            </a:endParaRPr>
+          </a:p>
+        </p:txBody>
+      </p:sp>
+      <p:grpSp>
+        <p:nvGrpSpPr>
+          <p:cNvPr id="63" name="Group 62">
+            <a:extLst>
+              <a:ext uri="{FF2B5EF4-FFF2-40B4-BE49-F238E27FC236}">
+                <a16:creationId xmlns:a16="http://schemas.microsoft.com/office/drawing/2014/main" id="{1506699D-AB78-C4AA-2204-D81FE8B2B750}"/>
+              </a:ext>
+            </a:extLst>
+          </p:cNvPr>
+          <p:cNvGrpSpPr/>
+          <p:nvPr/>
+        </p:nvGrpSpPr>
+        <p:grpSpPr>
+          <a:xfrm>
+            <a:off x="764190" y="5018649"/>
+            <a:ext cx="808313" cy="173823"/>
+            <a:chOff x="805980" y="5018649"/>
+            <a:chExt cx="808313" cy="173823"/>
+          </a:xfrm>
+        </p:grpSpPr>
+        <p:sp>
+          <p:nvSpPr>
+            <p:cNvPr id="52" name="Rectangle 51">
+              <a:extLst>
+                <a:ext uri="{FF2B5EF4-FFF2-40B4-BE49-F238E27FC236}">
+                  <a16:creationId xmlns:a16="http://schemas.microsoft.com/office/drawing/2014/main" id="{FA9691DC-D90E-D52C-A9AA-0955DD1B46E2}"/>
+                </a:ext>
+              </a:extLst>
+            </p:cNvPr>
+            <p:cNvSpPr/>
+            <p:nvPr/>
+          </p:nvSpPr>
+          <p:spPr>
+            <a:xfrm>
+              <a:off x="805980" y="5018649"/>
+              <a:ext cx="808313" cy="173823"/>
+            </a:xfrm>
+            <a:prstGeom prst="rect">
+              <a:avLst/>
+            </a:prstGeom>
+            <a:solidFill>
+              <a:schemeClr val="tx2">
+                <a:lumMod val="50000"/>
+                <a:lumOff val="50000"/>
+              </a:schemeClr>
+            </a:solidFill>
+          </p:spPr>
+          <p:style>
+            <a:lnRef idx="2">
+              <a:schemeClr val="accent1">
+                <a:shade val="15000"/>
+              </a:schemeClr>
+            </a:lnRef>
+            <a:fillRef idx="1">
+              <a:schemeClr val="accent1"/>
+            </a:fillRef>
+            <a:effectRef idx="0">
+              <a:schemeClr val="accent1"/>
+            </a:effectRef>
+            <a:fontRef idx="minor">
+              <a:schemeClr val="lt1"/>
+            </a:fontRef>
+          </p:style>
+          <p:txBody>
+            <a:bodyPr lIns="182880" tIns="0" rIns="0" bIns="0" rtlCol="0" anchor="ctr"/>
+            <a:lstStyle/>
+            <a:p>
+              <a:pPr algn="ctr"/>
+              <a:r>
+                <a:rPr lang="en-US" sz="700" dirty="0">
+                  <a:solidFill>
+                    <a:schemeClr val="tx1"/>
+                  </a:solidFill>
+                </a:rPr>
+                <a:t>User Action</a:t>
+              </a:r>
+              <a:endParaRPr lang="en-GB" sz="700" dirty="0">
+                <a:solidFill>
+                  <a:schemeClr val="tx1"/>
+                </a:solidFill>
+              </a:endParaRPr>
+            </a:p>
+          </p:txBody>
+        </p:sp>
+        <p:pic>
+          <p:nvPicPr>
+            <p:cNvPr id="61" name="Graphic 60" descr="User with solid fill">
+              <a:extLst>
+                <a:ext uri="{FF2B5EF4-FFF2-40B4-BE49-F238E27FC236}">
+                  <a16:creationId xmlns:a16="http://schemas.microsoft.com/office/drawing/2014/main" id="{E8547AC2-C3F9-150E-8391-8E4EA9FE3BD6}"/>
+                </a:ext>
+              </a:extLst>
+            </p:cNvPr>
+            <p:cNvPicPr>
+              <a:picLocks noChangeAspect="1"/>
+            </p:cNvPicPr>
+            <p:nvPr/>
+          </p:nvPicPr>
+          <p:blipFill>
+            <a:blip r:embed="rId2">
+              <a:extLst>
+                <a:ext uri="{96DAC541-7B7A-43D3-8B79-37D633B846F1}">
+                  <asvg:svgBlip xmlns:asvg="http://schemas.microsoft.com/office/drawing/2016/SVG/main" r:embed="rId3"/>
+                </a:ext>
+              </a:extLst>
+            </a:blip>
+            <a:stretch>
+              <a:fillRect/>
+            </a:stretch>
+          </p:blipFill>
+          <p:spPr>
+            <a:xfrm>
+              <a:off x="883805" y="5030804"/>
+              <a:ext cx="149512" cy="149512"/>
+            </a:xfrm>
+            <a:prstGeom prst="rect">
+              <a:avLst/>
+            </a:prstGeom>
+          </p:spPr>
+        </p:pic>
+      </p:grpSp>
     </p:spTree>
     <p:extLst>
       <p:ext uri="{BB962C8B-B14F-4D97-AF65-F5344CB8AC3E}">

</xml_diff>